<commit_message>
add basic placeholder screen for results and update basic flow to allow closing an experiment
</commit_message>
<xml_diff>
--- a/structure.pptx
+++ b/structure.pptx
@@ -7,6 +7,9 @@
   <p:sldIdLst>
     <p:sldId id="257" r:id="rId2"/>
     <p:sldId id="259" r:id="rId3"/>
+    <p:sldId id="261" r:id="rId4"/>
+    <p:sldId id="262" r:id="rId5"/>
+    <p:sldId id="260" r:id="rId6"/>
   </p:sldIdLst>
   <p:sldSz cx="12192000" cy="6858000"/>
   <p:notesSz cx="6858000" cy="9144000"/>
@@ -105,6 +108,11 @@
       </a:defRPr>
     </a:lvl9pPr>
   </p:defaultTextStyle>
+  <p:extLst>
+    <p:ext uri="{EFAFB233-063F-42B5-8137-9DF3F51BA10A}">
+      <p15:sldGuideLst xmlns:p15="http://schemas.microsoft.com/office/powerpoint/2012/main"/>
+    </p:ext>
+  </p:extLst>
 </p:presentation>
 </file>
 
@@ -255,7 +263,7 @@
           <a:p>
             <a:fld id="{618181AA-C4B3-40B8-B806-9F2FAFD7D3A6}" type="datetimeFigureOut">
               <a:rPr lang="en-US" smtClean="0"/>
-              <a:t>6/19/2024</a:t>
+              <a:t>7/10/2024</a:t>
             </a:fld>
             <a:endParaRPr lang="en-US"/>
           </a:p>
@@ -453,7 +461,7 @@
           <a:p>
             <a:fld id="{618181AA-C4B3-40B8-B806-9F2FAFD7D3A6}" type="datetimeFigureOut">
               <a:rPr lang="en-US" smtClean="0"/>
-              <a:t>6/19/2024</a:t>
+              <a:t>7/10/2024</a:t>
             </a:fld>
             <a:endParaRPr lang="en-US"/>
           </a:p>
@@ -661,7 +669,7 @@
           <a:p>
             <a:fld id="{618181AA-C4B3-40B8-B806-9F2FAFD7D3A6}" type="datetimeFigureOut">
               <a:rPr lang="en-US" smtClean="0"/>
-              <a:t>6/19/2024</a:t>
+              <a:t>7/10/2024</a:t>
             </a:fld>
             <a:endParaRPr lang="en-US"/>
           </a:p>
@@ -859,7 +867,7 @@
           <a:p>
             <a:fld id="{618181AA-C4B3-40B8-B806-9F2FAFD7D3A6}" type="datetimeFigureOut">
               <a:rPr lang="en-US" smtClean="0"/>
-              <a:t>6/19/2024</a:t>
+              <a:t>7/10/2024</a:t>
             </a:fld>
             <a:endParaRPr lang="en-US"/>
           </a:p>
@@ -1134,7 +1142,7 @@
           <a:p>
             <a:fld id="{618181AA-C4B3-40B8-B806-9F2FAFD7D3A6}" type="datetimeFigureOut">
               <a:rPr lang="en-US" smtClean="0"/>
-              <a:t>6/19/2024</a:t>
+              <a:t>7/10/2024</a:t>
             </a:fld>
             <a:endParaRPr lang="en-US"/>
           </a:p>
@@ -1399,7 +1407,7 @@
           <a:p>
             <a:fld id="{618181AA-C4B3-40B8-B806-9F2FAFD7D3A6}" type="datetimeFigureOut">
               <a:rPr lang="en-US" smtClean="0"/>
-              <a:t>6/19/2024</a:t>
+              <a:t>7/10/2024</a:t>
             </a:fld>
             <a:endParaRPr lang="en-US"/>
           </a:p>
@@ -1811,7 +1819,7 @@
           <a:p>
             <a:fld id="{618181AA-C4B3-40B8-B806-9F2FAFD7D3A6}" type="datetimeFigureOut">
               <a:rPr lang="en-US" smtClean="0"/>
-              <a:t>6/19/2024</a:t>
+              <a:t>7/10/2024</a:t>
             </a:fld>
             <a:endParaRPr lang="en-US"/>
           </a:p>
@@ -1952,7 +1960,7 @@
           <a:p>
             <a:fld id="{618181AA-C4B3-40B8-B806-9F2FAFD7D3A6}" type="datetimeFigureOut">
               <a:rPr lang="en-US" smtClean="0"/>
-              <a:t>6/19/2024</a:t>
+              <a:t>7/10/2024</a:t>
             </a:fld>
             <a:endParaRPr lang="en-US"/>
           </a:p>
@@ -2065,7 +2073,7 @@
           <a:p>
             <a:fld id="{618181AA-C4B3-40B8-B806-9F2FAFD7D3A6}" type="datetimeFigureOut">
               <a:rPr lang="en-US" smtClean="0"/>
-              <a:t>6/19/2024</a:t>
+              <a:t>7/10/2024</a:t>
             </a:fld>
             <a:endParaRPr lang="en-US"/>
           </a:p>
@@ -2376,7 +2384,7 @@
           <a:p>
             <a:fld id="{618181AA-C4B3-40B8-B806-9F2FAFD7D3A6}" type="datetimeFigureOut">
               <a:rPr lang="en-US" smtClean="0"/>
-              <a:t>6/19/2024</a:t>
+              <a:t>7/10/2024</a:t>
             </a:fld>
             <a:endParaRPr lang="en-US"/>
           </a:p>
@@ -2664,7 +2672,7 @@
           <a:p>
             <a:fld id="{618181AA-C4B3-40B8-B806-9F2FAFD7D3A6}" type="datetimeFigureOut">
               <a:rPr lang="en-US" smtClean="0"/>
-              <a:t>6/19/2024</a:t>
+              <a:t>7/10/2024</a:t>
             </a:fld>
             <a:endParaRPr lang="en-US"/>
           </a:p>
@@ -2905,7 +2913,7 @@
           <a:p>
             <a:fld id="{618181AA-C4B3-40B8-B806-9F2FAFD7D3A6}" type="datetimeFigureOut">
               <a:rPr lang="en-US" smtClean="0"/>
-              <a:t>6/19/2024</a:t>
+              <a:t>7/10/2024</a:t>
             </a:fld>
             <a:endParaRPr lang="en-US"/>
           </a:p>
@@ -4124,8 +4132,8 @@
         </p:nvSpPr>
         <p:spPr>
           <a:xfrm>
-            <a:off x="9100960" y="884909"/>
-            <a:ext cx="1939978" cy="1569660"/>
+            <a:off x="9019540" y="1050399"/>
+            <a:ext cx="2660721" cy="1323439"/>
           </a:xfrm>
           <a:prstGeom prst="rect">
             <a:avLst/>
@@ -4187,9 +4195,6 @@
               <a:rPr lang="en-US" sz="1600" dirty="0" err="1"/>
               <a:t>voteCount</a:t>
             </a:r>
-            <a:endParaRPr lang="en-US" sz="1600" dirty="0"/>
-          </a:p>
-          <a:p>
             <a:endParaRPr lang="en-US" sz="1600" dirty="0"/>
           </a:p>
         </p:txBody>
@@ -4542,6 +4547,2732 @@
     <p:extLst>
       <p:ext uri="{BB962C8B-B14F-4D97-AF65-F5344CB8AC3E}">
         <p14:creationId xmlns:p14="http://schemas.microsoft.com/office/powerpoint/2010/main" val="720953595"/>
+      </p:ext>
+    </p:extLst>
+  </p:cSld>
+  <p:clrMapOvr>
+    <a:masterClrMapping/>
+  </p:clrMapOvr>
+</p:sld>
+</file>
+
+<file path=ppt/slides/slide3.xml><?xml version="1.0" encoding="utf-8"?>
+<p:sld xmlns:a="http://schemas.openxmlformats.org/drawingml/2006/main" xmlns:r="http://schemas.openxmlformats.org/officeDocument/2006/relationships" xmlns:p="http://schemas.openxmlformats.org/presentationml/2006/main">
+  <p:cSld>
+    <p:spTree>
+      <p:nvGrpSpPr>
+        <p:cNvPr id="1" name=""/>
+        <p:cNvGrpSpPr/>
+        <p:nvPr/>
+      </p:nvGrpSpPr>
+      <p:grpSpPr>
+        <a:xfrm>
+          <a:off x="0" y="0"/>
+          <a:ext cx="0" cy="0"/>
+          <a:chOff x="0" y="0"/>
+          <a:chExt cx="0" cy="0"/>
+        </a:xfrm>
+      </p:grpSpPr>
+      <p:sp>
+        <p:nvSpPr>
+          <p:cNvPr id="4" name="Rectangle: Top Corners One Rounded and One Snipped 3">
+            <a:extLst>
+              <a:ext uri="{FF2B5EF4-FFF2-40B4-BE49-F238E27FC236}">
+                <a16:creationId xmlns:a16="http://schemas.microsoft.com/office/drawing/2014/main" id="{9E64377A-C4C3-0EB8-38A8-331848066C9B}"/>
+              </a:ext>
+            </a:extLst>
+          </p:cNvPr>
+          <p:cNvSpPr/>
+          <p:nvPr/>
+        </p:nvSpPr>
+        <p:spPr>
+          <a:xfrm flipH="1">
+            <a:off x="416511" y="599669"/>
+            <a:ext cx="1430754" cy="865375"/>
+          </a:xfrm>
+          <a:prstGeom prst="snipRoundRect">
+            <a:avLst>
+              <a:gd name="adj1" fmla="val 16667"/>
+              <a:gd name="adj2" fmla="val 50000"/>
+            </a:avLst>
+          </a:prstGeom>
+        </p:spPr>
+        <p:style>
+          <a:lnRef idx="2">
+            <a:schemeClr val="accent1">
+              <a:shade val="15000"/>
+            </a:schemeClr>
+          </a:lnRef>
+          <a:fillRef idx="1">
+            <a:schemeClr val="accent1"/>
+          </a:fillRef>
+          <a:effectRef idx="0">
+            <a:schemeClr val="accent1"/>
+          </a:effectRef>
+          <a:fontRef idx="minor">
+            <a:schemeClr val="lt1"/>
+          </a:fontRef>
+        </p:style>
+        <p:txBody>
+          <a:bodyPr rtlCol="0" anchor="ctr"/>
+          <a:lstStyle/>
+          <a:p>
+            <a:pPr algn="ctr"/>
+            <a:r>
+              <a:rPr lang="en-US" dirty="0"/>
+              <a:t>admins</a:t>
+            </a:r>
+          </a:p>
+        </p:txBody>
+      </p:sp>
+      <p:sp>
+        <p:nvSpPr>
+          <p:cNvPr id="6" name="Rectangle: Top Corners One Rounded and One Snipped 5">
+            <a:extLst>
+              <a:ext uri="{FF2B5EF4-FFF2-40B4-BE49-F238E27FC236}">
+                <a16:creationId xmlns:a16="http://schemas.microsoft.com/office/drawing/2014/main" id="{B8B95493-0DB9-43FD-C20E-6A0908ADD414}"/>
+              </a:ext>
+            </a:extLst>
+          </p:cNvPr>
+          <p:cNvSpPr/>
+          <p:nvPr/>
+        </p:nvSpPr>
+        <p:spPr>
+          <a:xfrm flipH="1">
+            <a:off x="6137254" y="457955"/>
+            <a:ext cx="1430754" cy="865375"/>
+          </a:xfrm>
+          <a:prstGeom prst="snipRoundRect">
+            <a:avLst>
+              <a:gd name="adj1" fmla="val 16667"/>
+              <a:gd name="adj2" fmla="val 50000"/>
+            </a:avLst>
+          </a:prstGeom>
+        </p:spPr>
+        <p:style>
+          <a:lnRef idx="2">
+            <a:schemeClr val="accent1">
+              <a:shade val="15000"/>
+            </a:schemeClr>
+          </a:lnRef>
+          <a:fillRef idx="1">
+            <a:schemeClr val="accent1"/>
+          </a:fillRef>
+          <a:effectRef idx="0">
+            <a:schemeClr val="accent1"/>
+          </a:effectRef>
+          <a:fontRef idx="minor">
+            <a:schemeClr val="lt1"/>
+          </a:fontRef>
+        </p:style>
+        <p:txBody>
+          <a:bodyPr rtlCol="0" anchor="ctr"/>
+          <a:lstStyle/>
+          <a:p>
+            <a:pPr algn="ctr"/>
+            <a:r>
+              <a:rPr lang="en-US" dirty="0"/>
+              <a:t>ex-</a:t>
+            </a:r>
+            <a:r>
+              <a:rPr lang="en-US" dirty="0" err="1"/>
+              <a:t>periments</a:t>
+            </a:r>
+            <a:endParaRPr lang="en-US" dirty="0"/>
+          </a:p>
+        </p:txBody>
+      </p:sp>
+      <p:sp>
+        <p:nvSpPr>
+          <p:cNvPr id="7" name="Rectangle: Top Corners One Rounded and One Snipped 6">
+            <a:extLst>
+              <a:ext uri="{FF2B5EF4-FFF2-40B4-BE49-F238E27FC236}">
+                <a16:creationId xmlns:a16="http://schemas.microsoft.com/office/drawing/2014/main" id="{E3B6BC4F-1D00-C000-9BCD-345547D24757}"/>
+              </a:ext>
+            </a:extLst>
+          </p:cNvPr>
+          <p:cNvSpPr/>
+          <p:nvPr/>
+        </p:nvSpPr>
+        <p:spPr>
+          <a:xfrm flipH="1">
+            <a:off x="7268591" y="2703614"/>
+            <a:ext cx="1430754" cy="865375"/>
+          </a:xfrm>
+          <a:prstGeom prst="snipRoundRect">
+            <a:avLst>
+              <a:gd name="adj1" fmla="val 16667"/>
+              <a:gd name="adj2" fmla="val 50000"/>
+            </a:avLst>
+          </a:prstGeom>
+        </p:spPr>
+        <p:style>
+          <a:lnRef idx="2">
+            <a:schemeClr val="accent1">
+              <a:shade val="15000"/>
+            </a:schemeClr>
+          </a:lnRef>
+          <a:fillRef idx="1">
+            <a:schemeClr val="accent1"/>
+          </a:fillRef>
+          <a:effectRef idx="0">
+            <a:schemeClr val="accent1"/>
+          </a:effectRef>
+          <a:fontRef idx="minor">
+            <a:schemeClr val="lt1"/>
+          </a:fontRef>
+        </p:style>
+        <p:txBody>
+          <a:bodyPr rtlCol="0" anchor="ctr"/>
+          <a:lstStyle/>
+          <a:p>
+            <a:pPr algn="ctr"/>
+            <a:r>
+              <a:rPr lang="en-US" dirty="0"/>
+              <a:t>users</a:t>
+            </a:r>
+          </a:p>
+        </p:txBody>
+      </p:sp>
+      <p:sp>
+        <p:nvSpPr>
+          <p:cNvPr id="9" name="Scroll: Vertical 8">
+            <a:extLst>
+              <a:ext uri="{FF2B5EF4-FFF2-40B4-BE49-F238E27FC236}">
+                <a16:creationId xmlns:a16="http://schemas.microsoft.com/office/drawing/2014/main" id="{2CD99B52-E175-1507-1B2D-B52C0C091A36}"/>
+              </a:ext>
+            </a:extLst>
+          </p:cNvPr>
+          <p:cNvSpPr/>
+          <p:nvPr/>
+        </p:nvSpPr>
+        <p:spPr>
+          <a:xfrm>
+            <a:off x="897005" y="1626408"/>
+            <a:ext cx="1900519" cy="1039626"/>
+          </a:xfrm>
+          <a:prstGeom prst="verticalScroll">
+            <a:avLst/>
+          </a:prstGeom>
+        </p:spPr>
+        <p:style>
+          <a:lnRef idx="2">
+            <a:schemeClr val="accent2">
+              <a:shade val="15000"/>
+            </a:schemeClr>
+          </a:lnRef>
+          <a:fillRef idx="1">
+            <a:schemeClr val="accent2"/>
+          </a:fillRef>
+          <a:effectRef idx="0">
+            <a:schemeClr val="accent2"/>
+          </a:effectRef>
+          <a:fontRef idx="minor">
+            <a:schemeClr val="lt1"/>
+          </a:fontRef>
+        </p:style>
+        <p:txBody>
+          <a:bodyPr rtlCol="0" anchor="ctr"/>
+          <a:lstStyle/>
+          <a:p>
+            <a:pPr algn="ctr"/>
+            <a:r>
+              <a:rPr lang="en-US" dirty="0"/>
+              <a:t>adminUID123</a:t>
+            </a:r>
+          </a:p>
+        </p:txBody>
+      </p:sp>
+      <p:sp>
+        <p:nvSpPr>
+          <p:cNvPr id="10" name="Scroll: Vertical 9">
+            <a:extLst>
+              <a:ext uri="{FF2B5EF4-FFF2-40B4-BE49-F238E27FC236}">
+                <a16:creationId xmlns:a16="http://schemas.microsoft.com/office/drawing/2014/main" id="{AD44C28E-1182-B22D-9B67-9FAE70E6A082}"/>
+              </a:ext>
+            </a:extLst>
+          </p:cNvPr>
+          <p:cNvSpPr/>
+          <p:nvPr/>
+        </p:nvSpPr>
+        <p:spPr>
+          <a:xfrm>
+            <a:off x="6499408" y="1493659"/>
+            <a:ext cx="1900519" cy="1039626"/>
+          </a:xfrm>
+          <a:prstGeom prst="verticalScroll">
+            <a:avLst/>
+          </a:prstGeom>
+        </p:spPr>
+        <p:style>
+          <a:lnRef idx="2">
+            <a:schemeClr val="accent2">
+              <a:shade val="15000"/>
+            </a:schemeClr>
+          </a:lnRef>
+          <a:fillRef idx="1">
+            <a:schemeClr val="accent2"/>
+          </a:fillRef>
+          <a:effectRef idx="0">
+            <a:schemeClr val="accent2"/>
+          </a:effectRef>
+          <a:fontRef idx="minor">
+            <a:schemeClr val="lt1"/>
+          </a:fontRef>
+        </p:style>
+        <p:txBody>
+          <a:bodyPr rtlCol="0" anchor="ctr"/>
+          <a:lstStyle/>
+          <a:p>
+            <a:pPr algn="ctr"/>
+            <a:r>
+              <a:rPr lang="en-US" dirty="0" err="1"/>
+              <a:t>experimentXYZ</a:t>
+            </a:r>
+            <a:endParaRPr lang="en-US" dirty="0"/>
+          </a:p>
+        </p:txBody>
+      </p:sp>
+      <p:sp>
+        <p:nvSpPr>
+          <p:cNvPr id="11" name="TextBox 10">
+            <a:extLst>
+              <a:ext uri="{FF2B5EF4-FFF2-40B4-BE49-F238E27FC236}">
+                <a16:creationId xmlns:a16="http://schemas.microsoft.com/office/drawing/2014/main" id="{5EE71C63-F3DC-C8AE-C4FF-7FBF9008900A}"/>
+              </a:ext>
+            </a:extLst>
+          </p:cNvPr>
+          <p:cNvSpPr txBox="1"/>
+          <p:nvPr/>
+        </p:nvSpPr>
+        <p:spPr>
+          <a:xfrm>
+            <a:off x="8445961" y="1510031"/>
+            <a:ext cx="2660721" cy="1077218"/>
+          </a:xfrm>
+          <a:prstGeom prst="rect">
+            <a:avLst/>
+          </a:prstGeom>
+          <a:noFill/>
+        </p:spPr>
+        <p:txBody>
+          <a:bodyPr wrap="square" rtlCol="0">
+            <a:spAutoFit/>
+          </a:bodyPr>
+          <a:lstStyle/>
+          <a:p>
+            <a:pPr marL="285750" indent="-285750">
+              <a:buFont typeface="Arial" panose="020B0604020202020204" pitchFamily="34" charset="0"/>
+              <a:buChar char="•"/>
+            </a:pPr>
+            <a:r>
+              <a:rPr lang="en-US" sz="1600" dirty="0" err="1">
+                <a:solidFill>
+                  <a:srgbClr val="00B050"/>
+                </a:solidFill>
+              </a:rPr>
+              <a:t>createdBy</a:t>
+            </a:r>
+            <a:r>
+              <a:rPr lang="en-US" sz="1600" dirty="0">
+                <a:solidFill>
+                  <a:srgbClr val="00B050"/>
+                </a:solidFill>
+              </a:rPr>
+              <a:t>: adminUID123</a:t>
+            </a:r>
+          </a:p>
+          <a:p>
+            <a:pPr marL="285750" indent="-285750">
+              <a:buFont typeface="Arial" panose="020B0604020202020204" pitchFamily="34" charset="0"/>
+              <a:buChar char="•"/>
+            </a:pPr>
+            <a:r>
+              <a:rPr lang="en-US" sz="1600" dirty="0"/>
+              <a:t>name</a:t>
+            </a:r>
+          </a:p>
+          <a:p>
+            <a:pPr marL="285750" indent="-285750">
+              <a:buFont typeface="Arial" panose="020B0604020202020204" pitchFamily="34" charset="0"/>
+              <a:buChar char="•"/>
+            </a:pPr>
+            <a:r>
+              <a:rPr lang="en-US" sz="1600" dirty="0"/>
+              <a:t>location</a:t>
+            </a:r>
+          </a:p>
+          <a:p>
+            <a:pPr marL="285750" indent="-285750">
+              <a:buFont typeface="Arial" panose="020B0604020202020204" pitchFamily="34" charset="0"/>
+              <a:buChar char="•"/>
+            </a:pPr>
+            <a:r>
+              <a:rPr lang="en-US" sz="1600" dirty="0"/>
+              <a:t>status</a:t>
+            </a:r>
+          </a:p>
+        </p:txBody>
+      </p:sp>
+      <p:sp>
+        <p:nvSpPr>
+          <p:cNvPr id="12" name="TextBox 11">
+            <a:extLst>
+              <a:ext uri="{FF2B5EF4-FFF2-40B4-BE49-F238E27FC236}">
+                <a16:creationId xmlns:a16="http://schemas.microsoft.com/office/drawing/2014/main" id="{FB284E87-4CAE-C8D0-C9EF-C96ABF195110}"/>
+              </a:ext>
+            </a:extLst>
+          </p:cNvPr>
+          <p:cNvSpPr txBox="1"/>
+          <p:nvPr/>
+        </p:nvSpPr>
+        <p:spPr>
+          <a:xfrm>
+            <a:off x="2732572" y="1879153"/>
+            <a:ext cx="2879088" cy="830997"/>
+          </a:xfrm>
+          <a:prstGeom prst="rect">
+            <a:avLst/>
+          </a:prstGeom>
+          <a:noFill/>
+        </p:spPr>
+        <p:txBody>
+          <a:bodyPr wrap="square" rtlCol="0">
+            <a:spAutoFit/>
+          </a:bodyPr>
+          <a:lstStyle/>
+          <a:p>
+            <a:pPr marL="285750" indent="-285750">
+              <a:buFont typeface="Arial" panose="020B0604020202020204" pitchFamily="34" charset="0"/>
+              <a:buChar char="•"/>
+            </a:pPr>
+            <a:r>
+              <a:rPr lang="en-US" sz="1600" dirty="0"/>
+              <a:t>bool </a:t>
+            </a:r>
+            <a:r>
+              <a:rPr lang="en-US" sz="1600" dirty="0" err="1"/>
+              <a:t>isAnonymous</a:t>
+            </a:r>
+            <a:endParaRPr lang="en-US" sz="1600" dirty="0"/>
+          </a:p>
+          <a:p>
+            <a:pPr marL="285750" indent="-285750">
+              <a:buFont typeface="Arial" panose="020B0604020202020204" pitchFamily="34" charset="0"/>
+              <a:buChar char="•"/>
+            </a:pPr>
+            <a:r>
+              <a:rPr lang="en-US" sz="1600" dirty="0"/>
+              <a:t>int </a:t>
+            </a:r>
+            <a:r>
+              <a:rPr lang="en-US" sz="1600" dirty="0" err="1"/>
+              <a:t>createdExperimentCount</a:t>
+            </a:r>
+            <a:endParaRPr lang="en-US" sz="1600" dirty="0"/>
+          </a:p>
+          <a:p>
+            <a:endParaRPr lang="en-US" sz="1600" dirty="0"/>
+          </a:p>
+        </p:txBody>
+      </p:sp>
+      <p:sp>
+        <p:nvSpPr>
+          <p:cNvPr id="13" name="Scroll: Vertical 12">
+            <a:extLst>
+              <a:ext uri="{FF2B5EF4-FFF2-40B4-BE49-F238E27FC236}">
+                <a16:creationId xmlns:a16="http://schemas.microsoft.com/office/drawing/2014/main" id="{A828A30D-3A8D-2543-1D0D-0C93E0BB944E}"/>
+              </a:ext>
+            </a:extLst>
+          </p:cNvPr>
+          <p:cNvSpPr/>
+          <p:nvPr/>
+        </p:nvSpPr>
+        <p:spPr>
+          <a:xfrm>
+            <a:off x="8116657" y="3721076"/>
+            <a:ext cx="1900519" cy="1039626"/>
+          </a:xfrm>
+          <a:prstGeom prst="verticalScroll">
+            <a:avLst/>
+          </a:prstGeom>
+        </p:spPr>
+        <p:style>
+          <a:lnRef idx="2">
+            <a:schemeClr val="accent2">
+              <a:shade val="15000"/>
+            </a:schemeClr>
+          </a:lnRef>
+          <a:fillRef idx="1">
+            <a:schemeClr val="accent2"/>
+          </a:fillRef>
+          <a:effectRef idx="0">
+            <a:schemeClr val="accent2"/>
+          </a:effectRef>
+          <a:fontRef idx="minor">
+            <a:schemeClr val="lt1"/>
+          </a:fontRef>
+        </p:style>
+        <p:txBody>
+          <a:bodyPr rtlCol="0" anchor="ctr"/>
+          <a:lstStyle/>
+          <a:p>
+            <a:pPr algn="ctr"/>
+            <a:r>
+              <a:rPr lang="en-US" dirty="0"/>
+              <a:t>userUID467</a:t>
+            </a:r>
+          </a:p>
+        </p:txBody>
+      </p:sp>
+      <p:sp>
+        <p:nvSpPr>
+          <p:cNvPr id="26" name="TextBox 25">
+            <a:extLst>
+              <a:ext uri="{FF2B5EF4-FFF2-40B4-BE49-F238E27FC236}">
+                <a16:creationId xmlns:a16="http://schemas.microsoft.com/office/drawing/2014/main" id="{B850B1A6-2D83-4AF2-8EC7-B0DB03AC9380}"/>
+              </a:ext>
+            </a:extLst>
+          </p:cNvPr>
+          <p:cNvSpPr txBox="1"/>
+          <p:nvPr/>
+        </p:nvSpPr>
+        <p:spPr>
+          <a:xfrm>
+            <a:off x="10017176" y="4071612"/>
+            <a:ext cx="1317812" cy="338554"/>
+          </a:xfrm>
+          <a:prstGeom prst="rect">
+            <a:avLst/>
+          </a:prstGeom>
+          <a:noFill/>
+        </p:spPr>
+        <p:txBody>
+          <a:bodyPr wrap="square" rtlCol="0">
+            <a:spAutoFit/>
+          </a:bodyPr>
+          <a:lstStyle/>
+          <a:p>
+            <a:pPr marL="285750" indent="-285750">
+              <a:buFont typeface="Arial" panose="020B0604020202020204" pitchFamily="34" charset="0"/>
+              <a:buChar char="•"/>
+            </a:pPr>
+            <a:r>
+              <a:rPr lang="en-US" sz="1600" dirty="0"/>
+              <a:t>number</a:t>
+            </a:r>
+          </a:p>
+        </p:txBody>
+      </p:sp>
+      <p:sp>
+        <p:nvSpPr>
+          <p:cNvPr id="3" name="TextBox 2">
+            <a:extLst>
+              <a:ext uri="{FF2B5EF4-FFF2-40B4-BE49-F238E27FC236}">
+                <a16:creationId xmlns:a16="http://schemas.microsoft.com/office/drawing/2014/main" id="{CB3027E8-03C6-9ED6-D0EB-B1607EAFB921}"/>
+              </a:ext>
+            </a:extLst>
+          </p:cNvPr>
+          <p:cNvSpPr txBox="1"/>
+          <p:nvPr/>
+        </p:nvSpPr>
+        <p:spPr>
+          <a:xfrm>
+            <a:off x="8804557" y="2722964"/>
+            <a:ext cx="2302125" cy="1077218"/>
+          </a:xfrm>
+          <a:prstGeom prst="rect">
+            <a:avLst/>
+          </a:prstGeom>
+          <a:noFill/>
+        </p:spPr>
+        <p:txBody>
+          <a:bodyPr wrap="square" rtlCol="0">
+            <a:spAutoFit/>
+          </a:bodyPr>
+          <a:lstStyle/>
+          <a:p>
+            <a:r>
+              <a:rPr lang="en-US" sz="1600" dirty="0"/>
+              <a:t>If status == </a:t>
+            </a:r>
+            <a:r>
+              <a:rPr lang="en-US" sz="1600" dirty="0" err="1"/>
+              <a:t>inProgress</a:t>
+            </a:r>
+            <a:endParaRPr lang="en-US" sz="1600" dirty="0"/>
+          </a:p>
+          <a:p>
+            <a:endParaRPr lang="en-US" sz="1600" dirty="0"/>
+          </a:p>
+          <a:p>
+            <a:r>
+              <a:rPr lang="en-US" sz="1600" dirty="0"/>
+              <a:t>Allow to add user docs</a:t>
+            </a:r>
+          </a:p>
+          <a:p>
+            <a:endParaRPr lang="en-US" sz="1600" dirty="0"/>
+          </a:p>
+        </p:txBody>
+      </p:sp>
+      <p:sp>
+        <p:nvSpPr>
+          <p:cNvPr id="2" name="Rectangle: Top Corners One Rounded and One Snipped 1">
+            <a:extLst>
+              <a:ext uri="{FF2B5EF4-FFF2-40B4-BE49-F238E27FC236}">
+                <a16:creationId xmlns:a16="http://schemas.microsoft.com/office/drawing/2014/main" id="{35DF2E9D-59A6-F651-9B6C-18A601CEBDB9}"/>
+              </a:ext>
+            </a:extLst>
+          </p:cNvPr>
+          <p:cNvSpPr/>
+          <p:nvPr/>
+        </p:nvSpPr>
+        <p:spPr>
+          <a:xfrm flipH="1">
+            <a:off x="376517" y="3800798"/>
+            <a:ext cx="1430754" cy="865375"/>
+          </a:xfrm>
+          <a:prstGeom prst="snipRoundRect">
+            <a:avLst>
+              <a:gd name="adj1" fmla="val 16667"/>
+              <a:gd name="adj2" fmla="val 50000"/>
+            </a:avLst>
+          </a:prstGeom>
+        </p:spPr>
+        <p:style>
+          <a:lnRef idx="2">
+            <a:schemeClr val="accent1">
+              <a:shade val="15000"/>
+            </a:schemeClr>
+          </a:lnRef>
+          <a:fillRef idx="1">
+            <a:schemeClr val="accent1"/>
+          </a:fillRef>
+          <a:effectRef idx="0">
+            <a:schemeClr val="accent1"/>
+          </a:effectRef>
+          <a:fontRef idx="minor">
+            <a:schemeClr val="lt1"/>
+          </a:fontRef>
+        </p:style>
+        <p:txBody>
+          <a:bodyPr rtlCol="0" anchor="ctr"/>
+          <a:lstStyle/>
+          <a:p>
+            <a:pPr algn="ctr"/>
+            <a:r>
+              <a:rPr lang="en-US" dirty="0"/>
+              <a:t>settings</a:t>
+            </a:r>
+          </a:p>
+        </p:txBody>
+      </p:sp>
+      <p:sp>
+        <p:nvSpPr>
+          <p:cNvPr id="15" name="Scroll: Vertical 14">
+            <a:extLst>
+              <a:ext uri="{FF2B5EF4-FFF2-40B4-BE49-F238E27FC236}">
+                <a16:creationId xmlns:a16="http://schemas.microsoft.com/office/drawing/2014/main" id="{C543EB0D-D87C-C59F-0905-E328CBA912CC}"/>
+              </a:ext>
+            </a:extLst>
+          </p:cNvPr>
+          <p:cNvSpPr/>
+          <p:nvPr/>
+        </p:nvSpPr>
+        <p:spPr>
+          <a:xfrm>
+            <a:off x="728978" y="4893614"/>
+            <a:ext cx="1900519" cy="1039626"/>
+          </a:xfrm>
+          <a:prstGeom prst="verticalScroll">
+            <a:avLst/>
+          </a:prstGeom>
+        </p:spPr>
+        <p:style>
+          <a:lnRef idx="2">
+            <a:schemeClr val="accent2">
+              <a:shade val="15000"/>
+            </a:schemeClr>
+          </a:lnRef>
+          <a:fillRef idx="1">
+            <a:schemeClr val="accent2"/>
+          </a:fillRef>
+          <a:effectRef idx="0">
+            <a:schemeClr val="accent2"/>
+          </a:effectRef>
+          <a:fontRef idx="minor">
+            <a:schemeClr val="lt1"/>
+          </a:fontRef>
+        </p:style>
+        <p:txBody>
+          <a:bodyPr rtlCol="0" anchor="ctr"/>
+          <a:lstStyle/>
+          <a:p>
+            <a:pPr algn="ctr"/>
+            <a:r>
+              <a:rPr lang="en-US" dirty="0" err="1"/>
+              <a:t>generalSettings</a:t>
+            </a:r>
+            <a:endParaRPr lang="en-US" dirty="0"/>
+          </a:p>
+        </p:txBody>
+      </p:sp>
+      <p:sp>
+        <p:nvSpPr>
+          <p:cNvPr id="16" name="TextBox 15">
+            <a:extLst>
+              <a:ext uri="{FF2B5EF4-FFF2-40B4-BE49-F238E27FC236}">
+                <a16:creationId xmlns:a16="http://schemas.microsoft.com/office/drawing/2014/main" id="{F7FF38BD-863A-4879-D325-EF8FFF1A53EA}"/>
+              </a:ext>
+            </a:extLst>
+          </p:cNvPr>
+          <p:cNvSpPr txBox="1"/>
+          <p:nvPr/>
+        </p:nvSpPr>
+        <p:spPr>
+          <a:xfrm>
+            <a:off x="2629497" y="5080919"/>
+            <a:ext cx="3379694" cy="584775"/>
+          </a:xfrm>
+          <a:prstGeom prst="rect">
+            <a:avLst/>
+          </a:prstGeom>
+          <a:noFill/>
+        </p:spPr>
+        <p:txBody>
+          <a:bodyPr wrap="square" rtlCol="0">
+            <a:spAutoFit/>
+          </a:bodyPr>
+          <a:lstStyle/>
+          <a:p>
+            <a:pPr marL="285750" indent="-285750">
+              <a:buFont typeface="Arial" panose="020B0604020202020204" pitchFamily="34" charset="0"/>
+              <a:buChar char="•"/>
+            </a:pPr>
+            <a:r>
+              <a:rPr lang="en-US" sz="1600" dirty="0"/>
+              <a:t>int </a:t>
+            </a:r>
+            <a:r>
+              <a:rPr lang="en-US" sz="1600" dirty="0" err="1"/>
+              <a:t>freeExperimentCount</a:t>
+            </a:r>
+            <a:endParaRPr lang="en-US" sz="1600" dirty="0"/>
+          </a:p>
+          <a:p>
+            <a:endParaRPr lang="en-US" sz="1600" dirty="0"/>
+          </a:p>
+        </p:txBody>
+      </p:sp>
+      <p:sp>
+        <p:nvSpPr>
+          <p:cNvPr id="5" name="TextBox 4">
+            <a:extLst>
+              <a:ext uri="{FF2B5EF4-FFF2-40B4-BE49-F238E27FC236}">
+                <a16:creationId xmlns:a16="http://schemas.microsoft.com/office/drawing/2014/main" id="{4BF97F52-737D-7564-80DA-42268FE8A147}"/>
+              </a:ext>
+            </a:extLst>
+          </p:cNvPr>
+          <p:cNvSpPr txBox="1"/>
+          <p:nvPr/>
+        </p:nvSpPr>
+        <p:spPr>
+          <a:xfrm>
+            <a:off x="1495891" y="6107658"/>
+            <a:ext cx="2518701" cy="338554"/>
+          </a:xfrm>
+          <a:prstGeom prst="rect">
+            <a:avLst/>
+          </a:prstGeom>
+          <a:noFill/>
+          <a:ln>
+            <a:solidFill>
+              <a:schemeClr val="accent1"/>
+            </a:solidFill>
+          </a:ln>
+        </p:spPr>
+        <p:txBody>
+          <a:bodyPr wrap="square" rtlCol="0">
+            <a:spAutoFit/>
+          </a:bodyPr>
+          <a:lstStyle/>
+          <a:p>
+            <a:r>
+              <a:rPr lang="en-US" sz="1600" i="1" dirty="0"/>
+              <a:t>Everyone signed in can read</a:t>
+            </a:r>
+          </a:p>
+        </p:txBody>
+      </p:sp>
+      <p:sp>
+        <p:nvSpPr>
+          <p:cNvPr id="8" name="TextBox 7">
+            <a:extLst>
+              <a:ext uri="{FF2B5EF4-FFF2-40B4-BE49-F238E27FC236}">
+                <a16:creationId xmlns:a16="http://schemas.microsoft.com/office/drawing/2014/main" id="{66140628-6EF7-B46E-3438-6834D1D7DCFE}"/>
+              </a:ext>
+            </a:extLst>
+          </p:cNvPr>
+          <p:cNvSpPr txBox="1"/>
+          <p:nvPr/>
+        </p:nvSpPr>
+        <p:spPr>
+          <a:xfrm>
+            <a:off x="2061978" y="2803803"/>
+            <a:ext cx="2180498" cy="584775"/>
+          </a:xfrm>
+          <a:prstGeom prst="rect">
+            <a:avLst/>
+          </a:prstGeom>
+          <a:noFill/>
+          <a:ln>
+            <a:solidFill>
+              <a:schemeClr val="accent1"/>
+            </a:solidFill>
+          </a:ln>
+        </p:spPr>
+        <p:txBody>
+          <a:bodyPr wrap="square" rtlCol="0">
+            <a:spAutoFit/>
+          </a:bodyPr>
+          <a:lstStyle/>
+          <a:p>
+            <a:r>
+              <a:rPr lang="en-US" sz="1600" i="1" dirty="0"/>
+              <a:t>Only admin with same UID can read and write</a:t>
+            </a:r>
+          </a:p>
+        </p:txBody>
+      </p:sp>
+      <p:sp>
+        <p:nvSpPr>
+          <p:cNvPr id="14" name="TextBox 13">
+            <a:extLst>
+              <a:ext uri="{FF2B5EF4-FFF2-40B4-BE49-F238E27FC236}">
+                <a16:creationId xmlns:a16="http://schemas.microsoft.com/office/drawing/2014/main" id="{C64B8F65-9BC6-2296-FFD3-F58B384E119D}"/>
+              </a:ext>
+            </a:extLst>
+          </p:cNvPr>
+          <p:cNvSpPr txBox="1"/>
+          <p:nvPr/>
+        </p:nvSpPr>
+        <p:spPr>
+          <a:xfrm>
+            <a:off x="9493609" y="5815270"/>
+            <a:ext cx="2180498" cy="584775"/>
+          </a:xfrm>
+          <a:prstGeom prst="rect">
+            <a:avLst/>
+          </a:prstGeom>
+          <a:noFill/>
+          <a:ln>
+            <a:solidFill>
+              <a:schemeClr val="accent1"/>
+            </a:solidFill>
+          </a:ln>
+        </p:spPr>
+        <p:txBody>
+          <a:bodyPr wrap="square" rtlCol="0">
+            <a:spAutoFit/>
+          </a:bodyPr>
+          <a:lstStyle/>
+          <a:p>
+            <a:r>
+              <a:rPr lang="en-US" sz="1600" i="1" dirty="0"/>
+              <a:t>Only admin with same UID can read and write</a:t>
+            </a:r>
+          </a:p>
+        </p:txBody>
+      </p:sp>
+      <p:sp>
+        <p:nvSpPr>
+          <p:cNvPr id="17" name="TextBox 16">
+            <a:extLst>
+              <a:ext uri="{FF2B5EF4-FFF2-40B4-BE49-F238E27FC236}">
+                <a16:creationId xmlns:a16="http://schemas.microsoft.com/office/drawing/2014/main" id="{9A54DE64-88CA-83D6-FEB7-B7BDB53A3B0C}"/>
+              </a:ext>
+            </a:extLst>
+          </p:cNvPr>
+          <p:cNvSpPr txBox="1"/>
+          <p:nvPr/>
+        </p:nvSpPr>
+        <p:spPr>
+          <a:xfrm>
+            <a:off x="8261000" y="289588"/>
+            <a:ext cx="3682567" cy="1077218"/>
+          </a:xfrm>
+          <a:prstGeom prst="rect">
+            <a:avLst/>
+          </a:prstGeom>
+          <a:noFill/>
+          <a:ln>
+            <a:solidFill>
+              <a:schemeClr val="accent1"/>
+            </a:solidFill>
+          </a:ln>
+        </p:spPr>
+        <p:txBody>
+          <a:bodyPr wrap="square" rtlCol="0">
+            <a:spAutoFit/>
+          </a:bodyPr>
+          <a:lstStyle/>
+          <a:p>
+            <a:r>
+              <a:rPr lang="en-US" sz="1600" i="1" dirty="0"/>
+              <a:t>Only admin with same UID can read, update and delete</a:t>
+            </a:r>
+          </a:p>
+          <a:p>
+            <a:r>
+              <a:rPr lang="en-US" sz="1600" i="1" dirty="0"/>
+              <a:t>Only if </a:t>
+            </a:r>
+            <a:r>
+              <a:rPr lang="en-US" sz="1600" i="1" dirty="0" err="1"/>
+              <a:t>createdExperimentCount</a:t>
+            </a:r>
+            <a:r>
+              <a:rPr lang="en-US" sz="1600" i="1" dirty="0"/>
+              <a:t> &lt; </a:t>
+            </a:r>
+            <a:r>
+              <a:rPr lang="en-US" sz="1600" i="1" dirty="0" err="1"/>
+              <a:t>freeExperimentCount</a:t>
+            </a:r>
+            <a:r>
+              <a:rPr lang="en-US" sz="1600" i="1" dirty="0"/>
+              <a:t> they can also create</a:t>
+            </a:r>
+          </a:p>
+        </p:txBody>
+      </p:sp>
+      <p:sp>
+        <p:nvSpPr>
+          <p:cNvPr id="18" name="TextBox 17">
+            <a:extLst>
+              <a:ext uri="{FF2B5EF4-FFF2-40B4-BE49-F238E27FC236}">
+                <a16:creationId xmlns:a16="http://schemas.microsoft.com/office/drawing/2014/main" id="{E28A9D38-D655-D512-F050-18BE46B77BC0}"/>
+              </a:ext>
+            </a:extLst>
+          </p:cNvPr>
+          <p:cNvSpPr txBox="1"/>
+          <p:nvPr/>
+        </p:nvSpPr>
+        <p:spPr>
+          <a:xfrm>
+            <a:off x="3707790" y="3782898"/>
+            <a:ext cx="3682567" cy="338554"/>
+          </a:xfrm>
+          <a:prstGeom prst="rect">
+            <a:avLst/>
+          </a:prstGeom>
+          <a:noFill/>
+          <a:ln>
+            <a:solidFill>
+              <a:schemeClr val="accent1"/>
+            </a:solidFill>
+          </a:ln>
+        </p:spPr>
+        <p:txBody>
+          <a:bodyPr wrap="square" rtlCol="0">
+            <a:spAutoFit/>
+          </a:bodyPr>
+          <a:lstStyle/>
+          <a:p>
+            <a:r>
+              <a:rPr lang="en-US" sz="1600" i="1" dirty="0"/>
+              <a:t>Everyone signed in can </a:t>
+            </a:r>
+          </a:p>
+        </p:txBody>
+      </p:sp>
+    </p:spTree>
+    <p:extLst>
+      <p:ext uri="{BB962C8B-B14F-4D97-AF65-F5344CB8AC3E}">
+        <p14:creationId xmlns:p14="http://schemas.microsoft.com/office/powerpoint/2010/main" val="1243884630"/>
+      </p:ext>
+    </p:extLst>
+  </p:cSld>
+  <p:clrMapOvr>
+    <a:masterClrMapping/>
+  </p:clrMapOvr>
+</p:sld>
+</file>
+
+<file path=ppt/slides/slide4.xml><?xml version="1.0" encoding="utf-8"?>
+<p:sld xmlns:a="http://schemas.openxmlformats.org/drawingml/2006/main" xmlns:r="http://schemas.openxmlformats.org/officeDocument/2006/relationships" xmlns:p="http://schemas.openxmlformats.org/presentationml/2006/main">
+  <p:cSld>
+    <p:spTree>
+      <p:nvGrpSpPr>
+        <p:cNvPr id="1" name=""/>
+        <p:cNvGrpSpPr/>
+        <p:nvPr/>
+      </p:nvGrpSpPr>
+      <p:grpSpPr>
+        <a:xfrm>
+          <a:off x="0" y="0"/>
+          <a:ext cx="0" cy="0"/>
+          <a:chOff x="0" y="0"/>
+          <a:chExt cx="0" cy="0"/>
+        </a:xfrm>
+      </p:grpSpPr>
+      <p:sp>
+        <p:nvSpPr>
+          <p:cNvPr id="4" name="Rectangle: Top Corners One Rounded and One Snipped 3">
+            <a:extLst>
+              <a:ext uri="{FF2B5EF4-FFF2-40B4-BE49-F238E27FC236}">
+                <a16:creationId xmlns:a16="http://schemas.microsoft.com/office/drawing/2014/main" id="{9E64377A-C4C3-0EB8-38A8-331848066C9B}"/>
+              </a:ext>
+            </a:extLst>
+          </p:cNvPr>
+          <p:cNvSpPr/>
+          <p:nvPr/>
+        </p:nvSpPr>
+        <p:spPr>
+          <a:xfrm flipH="1">
+            <a:off x="765691" y="526057"/>
+            <a:ext cx="893129" cy="540199"/>
+          </a:xfrm>
+          <a:prstGeom prst="snipRoundRect">
+            <a:avLst>
+              <a:gd name="adj1" fmla="val 16667"/>
+              <a:gd name="adj2" fmla="val 50000"/>
+            </a:avLst>
+          </a:prstGeom>
+        </p:spPr>
+        <p:style>
+          <a:lnRef idx="2">
+            <a:schemeClr val="accent1">
+              <a:shade val="15000"/>
+            </a:schemeClr>
+          </a:lnRef>
+          <a:fillRef idx="1">
+            <a:schemeClr val="accent1"/>
+          </a:fillRef>
+          <a:effectRef idx="0">
+            <a:schemeClr val="accent1"/>
+          </a:effectRef>
+          <a:fontRef idx="minor">
+            <a:schemeClr val="lt1"/>
+          </a:fontRef>
+        </p:style>
+        <p:txBody>
+          <a:bodyPr rtlCol="0" anchor="ctr"/>
+          <a:lstStyle/>
+          <a:p>
+            <a:pPr algn="ctr"/>
+            <a:r>
+              <a:rPr lang="en-US" sz="1200" dirty="0"/>
+              <a:t>admins</a:t>
+            </a:r>
+          </a:p>
+        </p:txBody>
+      </p:sp>
+      <p:sp>
+        <p:nvSpPr>
+          <p:cNvPr id="9" name="Scroll: Vertical 8">
+            <a:extLst>
+              <a:ext uri="{FF2B5EF4-FFF2-40B4-BE49-F238E27FC236}">
+                <a16:creationId xmlns:a16="http://schemas.microsoft.com/office/drawing/2014/main" id="{2CD99B52-E175-1507-1B2D-B52C0C091A36}"/>
+              </a:ext>
+            </a:extLst>
+          </p:cNvPr>
+          <p:cNvSpPr/>
+          <p:nvPr/>
+        </p:nvSpPr>
+        <p:spPr>
+          <a:xfrm>
+            <a:off x="1156513" y="1268141"/>
+            <a:ext cx="947819" cy="640803"/>
+          </a:xfrm>
+          <a:prstGeom prst="verticalScroll">
+            <a:avLst/>
+          </a:prstGeom>
+        </p:spPr>
+        <p:style>
+          <a:lnRef idx="2">
+            <a:schemeClr val="accent2">
+              <a:shade val="15000"/>
+            </a:schemeClr>
+          </a:lnRef>
+          <a:fillRef idx="1">
+            <a:schemeClr val="accent2"/>
+          </a:fillRef>
+          <a:effectRef idx="0">
+            <a:schemeClr val="accent2"/>
+          </a:effectRef>
+          <a:fontRef idx="minor">
+            <a:schemeClr val="lt1"/>
+          </a:fontRef>
+        </p:style>
+        <p:txBody>
+          <a:bodyPr rtlCol="0" anchor="ctr"/>
+          <a:lstStyle/>
+          <a:p>
+            <a:pPr algn="ctr"/>
+            <a:r>
+              <a:rPr lang="en-US" sz="1100" dirty="0"/>
+              <a:t>adminUID123</a:t>
+            </a:r>
+          </a:p>
+        </p:txBody>
+      </p:sp>
+      <p:sp>
+        <p:nvSpPr>
+          <p:cNvPr id="11" name="TextBox 10">
+            <a:extLst>
+              <a:ext uri="{FF2B5EF4-FFF2-40B4-BE49-F238E27FC236}">
+                <a16:creationId xmlns:a16="http://schemas.microsoft.com/office/drawing/2014/main" id="{5EE71C63-F3DC-C8AE-C4FF-7FBF9008900A}"/>
+              </a:ext>
+            </a:extLst>
+          </p:cNvPr>
+          <p:cNvSpPr txBox="1"/>
+          <p:nvPr/>
+        </p:nvSpPr>
+        <p:spPr>
+          <a:xfrm>
+            <a:off x="7684063" y="1066256"/>
+            <a:ext cx="2858779" cy="954107"/>
+          </a:xfrm>
+          <a:prstGeom prst="rect">
+            <a:avLst/>
+          </a:prstGeom>
+          <a:noFill/>
+        </p:spPr>
+        <p:txBody>
+          <a:bodyPr wrap="square" rtlCol="0">
+            <a:spAutoFit/>
+          </a:bodyPr>
+          <a:lstStyle/>
+          <a:p>
+            <a:pPr marL="285750" indent="-285750">
+              <a:buFont typeface="Arial" panose="020B0604020202020204" pitchFamily="34" charset="0"/>
+              <a:buChar char="•"/>
+            </a:pPr>
+            <a:r>
+              <a:rPr lang="en-US" sz="1400" dirty="0">
+                <a:solidFill>
+                  <a:srgbClr val="00B050"/>
+                </a:solidFill>
+              </a:rPr>
+              <a:t>String </a:t>
+            </a:r>
+            <a:r>
+              <a:rPr lang="en-US" sz="1400" dirty="0" err="1">
+                <a:solidFill>
+                  <a:srgbClr val="00B050"/>
+                </a:solidFill>
+              </a:rPr>
+              <a:t>createdBy</a:t>
+            </a:r>
+            <a:r>
+              <a:rPr lang="en-US" sz="1400" dirty="0">
+                <a:solidFill>
+                  <a:srgbClr val="00B050"/>
+                </a:solidFill>
+              </a:rPr>
+              <a:t>: adminUID123</a:t>
+            </a:r>
+          </a:p>
+          <a:p>
+            <a:pPr marL="285750" indent="-285750">
+              <a:buFont typeface="Arial" panose="020B0604020202020204" pitchFamily="34" charset="0"/>
+              <a:buChar char="•"/>
+            </a:pPr>
+            <a:r>
+              <a:rPr lang="en-US" sz="1400" dirty="0"/>
+              <a:t>String name</a:t>
+            </a:r>
+          </a:p>
+          <a:p>
+            <a:pPr marL="285750" indent="-285750">
+              <a:buFont typeface="Arial" panose="020B0604020202020204" pitchFamily="34" charset="0"/>
+              <a:buChar char="•"/>
+            </a:pPr>
+            <a:r>
+              <a:rPr lang="en-US" sz="1400" dirty="0"/>
+              <a:t>String location</a:t>
+            </a:r>
+          </a:p>
+          <a:p>
+            <a:pPr marL="285750" indent="-285750">
+              <a:buFont typeface="Arial" panose="020B0604020202020204" pitchFamily="34" charset="0"/>
+              <a:buChar char="•"/>
+            </a:pPr>
+            <a:r>
+              <a:rPr lang="en-US" sz="1400" dirty="0"/>
+              <a:t>String status (</a:t>
+            </a:r>
+            <a:r>
+              <a:rPr lang="en-US" sz="1400" dirty="0" err="1"/>
+              <a:t>enum</a:t>
+            </a:r>
+            <a:r>
+              <a:rPr lang="en-US" sz="1400" dirty="0"/>
+              <a:t>)</a:t>
+            </a:r>
+          </a:p>
+        </p:txBody>
+      </p:sp>
+      <p:sp>
+        <p:nvSpPr>
+          <p:cNvPr id="12" name="TextBox 11">
+            <a:extLst>
+              <a:ext uri="{FF2B5EF4-FFF2-40B4-BE49-F238E27FC236}">
+                <a16:creationId xmlns:a16="http://schemas.microsoft.com/office/drawing/2014/main" id="{FB284E87-4CAE-C8D0-C9EF-C96ABF195110}"/>
+              </a:ext>
+            </a:extLst>
+          </p:cNvPr>
+          <p:cNvSpPr txBox="1"/>
+          <p:nvPr/>
+        </p:nvSpPr>
+        <p:spPr>
+          <a:xfrm>
+            <a:off x="2150366" y="1316607"/>
+            <a:ext cx="2597253" cy="523220"/>
+          </a:xfrm>
+          <a:prstGeom prst="rect">
+            <a:avLst/>
+          </a:prstGeom>
+          <a:noFill/>
+        </p:spPr>
+        <p:txBody>
+          <a:bodyPr wrap="square" rtlCol="0">
+            <a:spAutoFit/>
+          </a:bodyPr>
+          <a:lstStyle/>
+          <a:p>
+            <a:pPr marL="285750" indent="-285750">
+              <a:buFont typeface="Arial" panose="020B0604020202020204" pitchFamily="34" charset="0"/>
+              <a:buChar char="•"/>
+            </a:pPr>
+            <a:r>
+              <a:rPr lang="en-US" sz="1400" dirty="0"/>
+              <a:t>bool </a:t>
+            </a:r>
+            <a:r>
+              <a:rPr lang="en-US" sz="1400" dirty="0" err="1"/>
+              <a:t>isAnonymous</a:t>
+            </a:r>
+            <a:endParaRPr lang="en-US" sz="1400" dirty="0"/>
+          </a:p>
+          <a:p>
+            <a:pPr marL="285750" indent="-285750">
+              <a:buFont typeface="Arial" panose="020B0604020202020204" pitchFamily="34" charset="0"/>
+              <a:buChar char="•"/>
+            </a:pPr>
+            <a:r>
+              <a:rPr lang="en-US" sz="1400" dirty="0"/>
+              <a:t>int </a:t>
+            </a:r>
+            <a:r>
+              <a:rPr lang="en-US" sz="1400" dirty="0" err="1"/>
+              <a:t>createdExperimentCount</a:t>
+            </a:r>
+            <a:endParaRPr lang="en-US" sz="1400" dirty="0"/>
+          </a:p>
+        </p:txBody>
+      </p:sp>
+      <p:sp>
+        <p:nvSpPr>
+          <p:cNvPr id="26" name="TextBox 25">
+            <a:extLst>
+              <a:ext uri="{FF2B5EF4-FFF2-40B4-BE49-F238E27FC236}">
+                <a16:creationId xmlns:a16="http://schemas.microsoft.com/office/drawing/2014/main" id="{B850B1A6-2D83-4AF2-8EC7-B0DB03AC9380}"/>
+              </a:ext>
+            </a:extLst>
+          </p:cNvPr>
+          <p:cNvSpPr txBox="1"/>
+          <p:nvPr/>
+        </p:nvSpPr>
+        <p:spPr>
+          <a:xfrm>
+            <a:off x="8087520" y="4466411"/>
+            <a:ext cx="1317812" cy="307777"/>
+          </a:xfrm>
+          <a:prstGeom prst="rect">
+            <a:avLst/>
+          </a:prstGeom>
+          <a:noFill/>
+        </p:spPr>
+        <p:txBody>
+          <a:bodyPr wrap="square" rtlCol="0">
+            <a:spAutoFit/>
+          </a:bodyPr>
+          <a:lstStyle/>
+          <a:p>
+            <a:pPr marL="285750" indent="-285750">
+              <a:buFont typeface="Arial" panose="020B0604020202020204" pitchFamily="34" charset="0"/>
+              <a:buChar char="•"/>
+            </a:pPr>
+            <a:r>
+              <a:rPr lang="en-US" sz="1400" dirty="0"/>
+              <a:t>int number</a:t>
+            </a:r>
+          </a:p>
+        </p:txBody>
+      </p:sp>
+      <p:sp>
+        <p:nvSpPr>
+          <p:cNvPr id="16" name="TextBox 15">
+            <a:extLst>
+              <a:ext uri="{FF2B5EF4-FFF2-40B4-BE49-F238E27FC236}">
+                <a16:creationId xmlns:a16="http://schemas.microsoft.com/office/drawing/2014/main" id="{F7FF38BD-863A-4879-D325-EF8FFF1A53EA}"/>
+              </a:ext>
+            </a:extLst>
+          </p:cNvPr>
+          <p:cNvSpPr txBox="1"/>
+          <p:nvPr/>
+        </p:nvSpPr>
+        <p:spPr>
+          <a:xfrm>
+            <a:off x="2211537" y="2951383"/>
+            <a:ext cx="2312021" cy="307777"/>
+          </a:xfrm>
+          <a:prstGeom prst="rect">
+            <a:avLst/>
+          </a:prstGeom>
+          <a:noFill/>
+        </p:spPr>
+        <p:txBody>
+          <a:bodyPr wrap="square" rtlCol="0">
+            <a:spAutoFit/>
+          </a:bodyPr>
+          <a:lstStyle/>
+          <a:p>
+            <a:pPr marL="285750" indent="-285750">
+              <a:buFont typeface="Arial" panose="020B0604020202020204" pitchFamily="34" charset="0"/>
+              <a:buChar char="•"/>
+            </a:pPr>
+            <a:r>
+              <a:rPr lang="en-US" sz="1400" dirty="0"/>
+              <a:t>int </a:t>
+            </a:r>
+            <a:r>
+              <a:rPr lang="en-US" sz="1400" dirty="0" err="1"/>
+              <a:t>freeExperimentCount</a:t>
+            </a:r>
+            <a:endParaRPr lang="en-US" sz="1400" dirty="0"/>
+          </a:p>
+        </p:txBody>
+      </p:sp>
+      <p:sp>
+        <p:nvSpPr>
+          <p:cNvPr id="5" name="TextBox 4">
+            <a:extLst>
+              <a:ext uri="{FF2B5EF4-FFF2-40B4-BE49-F238E27FC236}">
+                <a16:creationId xmlns:a16="http://schemas.microsoft.com/office/drawing/2014/main" id="{4BF97F52-737D-7564-80DA-42268FE8A147}"/>
+              </a:ext>
+            </a:extLst>
+          </p:cNvPr>
+          <p:cNvSpPr txBox="1"/>
+          <p:nvPr/>
+        </p:nvSpPr>
+        <p:spPr>
+          <a:xfrm>
+            <a:off x="1871828" y="2395645"/>
+            <a:ext cx="3523924" cy="307777"/>
+          </a:xfrm>
+          <a:prstGeom prst="rect">
+            <a:avLst/>
+          </a:prstGeom>
+          <a:noFill/>
+          <a:ln>
+            <a:solidFill>
+              <a:schemeClr val="accent1"/>
+            </a:solidFill>
+          </a:ln>
+        </p:spPr>
+        <p:txBody>
+          <a:bodyPr wrap="square" rtlCol="0">
+            <a:spAutoFit/>
+          </a:bodyPr>
+          <a:lstStyle/>
+          <a:p>
+            <a:r>
+              <a:rPr lang="en-US" sz="1400" i="1" dirty="0"/>
+              <a:t>Everyone signed in can read, nobody can write</a:t>
+            </a:r>
+          </a:p>
+        </p:txBody>
+      </p:sp>
+      <p:sp>
+        <p:nvSpPr>
+          <p:cNvPr id="8" name="TextBox 7">
+            <a:extLst>
+              <a:ext uri="{FF2B5EF4-FFF2-40B4-BE49-F238E27FC236}">
+                <a16:creationId xmlns:a16="http://schemas.microsoft.com/office/drawing/2014/main" id="{66140628-6EF7-B46E-3438-6834D1D7DCFE}"/>
+              </a:ext>
+            </a:extLst>
+          </p:cNvPr>
+          <p:cNvSpPr txBox="1"/>
+          <p:nvPr/>
+        </p:nvSpPr>
+        <p:spPr>
+          <a:xfrm>
+            <a:off x="2104332" y="629212"/>
+            <a:ext cx="1990192" cy="523220"/>
+          </a:xfrm>
+          <a:prstGeom prst="rect">
+            <a:avLst/>
+          </a:prstGeom>
+          <a:noFill/>
+          <a:ln>
+            <a:solidFill>
+              <a:schemeClr val="accent1"/>
+            </a:solidFill>
+          </a:ln>
+        </p:spPr>
+        <p:txBody>
+          <a:bodyPr wrap="square" rtlCol="0">
+            <a:spAutoFit/>
+          </a:bodyPr>
+          <a:lstStyle/>
+          <a:p>
+            <a:r>
+              <a:rPr lang="en-US" sz="1400" i="1" dirty="0"/>
+              <a:t>Only admin with same UID can read and write</a:t>
+            </a:r>
+          </a:p>
+        </p:txBody>
+      </p:sp>
+      <p:sp>
+        <p:nvSpPr>
+          <p:cNvPr id="17" name="TextBox 16">
+            <a:extLst>
+              <a:ext uri="{FF2B5EF4-FFF2-40B4-BE49-F238E27FC236}">
+                <a16:creationId xmlns:a16="http://schemas.microsoft.com/office/drawing/2014/main" id="{9A54DE64-88CA-83D6-FEB7-B7BDB53A3B0C}"/>
+              </a:ext>
+            </a:extLst>
+          </p:cNvPr>
+          <p:cNvSpPr txBox="1"/>
+          <p:nvPr/>
+        </p:nvSpPr>
+        <p:spPr>
+          <a:xfrm>
+            <a:off x="7258561" y="231968"/>
+            <a:ext cx="4221792" cy="738664"/>
+          </a:xfrm>
+          <a:prstGeom prst="rect">
+            <a:avLst/>
+          </a:prstGeom>
+          <a:noFill/>
+          <a:ln>
+            <a:solidFill>
+              <a:schemeClr val="accent1"/>
+            </a:solidFill>
+          </a:ln>
+        </p:spPr>
+        <p:txBody>
+          <a:bodyPr wrap="square" rtlCol="0">
+            <a:spAutoFit/>
+          </a:bodyPr>
+          <a:lstStyle/>
+          <a:p>
+            <a:r>
+              <a:rPr lang="en-US" sz="1400" i="1" dirty="0"/>
+              <a:t>Only admin with same UID can read, update and delete</a:t>
+            </a:r>
+          </a:p>
+          <a:p>
+            <a:r>
+              <a:rPr lang="en-US" sz="1400" i="1" dirty="0"/>
+              <a:t>Only if </a:t>
+            </a:r>
+            <a:r>
+              <a:rPr lang="en-US" sz="1400" i="1" dirty="0" err="1"/>
+              <a:t>createdExperimentCount</a:t>
+            </a:r>
+            <a:r>
+              <a:rPr lang="en-US" sz="1400" i="1" dirty="0"/>
+              <a:t> &lt; </a:t>
+            </a:r>
+            <a:r>
+              <a:rPr lang="en-US" sz="1400" i="1" dirty="0" err="1"/>
+              <a:t>freeExperimentCount</a:t>
+            </a:r>
+            <a:r>
+              <a:rPr lang="en-US" sz="1400" i="1" dirty="0"/>
+              <a:t> they can also create new experiments</a:t>
+            </a:r>
+          </a:p>
+        </p:txBody>
+      </p:sp>
+      <p:sp>
+        <p:nvSpPr>
+          <p:cNvPr id="19" name="Rectangle: Top Corners One Rounded and One Snipped 18">
+            <a:extLst>
+              <a:ext uri="{FF2B5EF4-FFF2-40B4-BE49-F238E27FC236}">
+                <a16:creationId xmlns:a16="http://schemas.microsoft.com/office/drawing/2014/main" id="{F86C0D5A-C782-1D84-34A0-907544E306E9}"/>
+              </a:ext>
+            </a:extLst>
+          </p:cNvPr>
+          <p:cNvSpPr/>
+          <p:nvPr/>
+        </p:nvSpPr>
+        <p:spPr>
+          <a:xfrm flipH="1">
+            <a:off x="765691" y="2110829"/>
+            <a:ext cx="893129" cy="540199"/>
+          </a:xfrm>
+          <a:prstGeom prst="snipRoundRect">
+            <a:avLst>
+              <a:gd name="adj1" fmla="val 16667"/>
+              <a:gd name="adj2" fmla="val 50000"/>
+            </a:avLst>
+          </a:prstGeom>
+        </p:spPr>
+        <p:style>
+          <a:lnRef idx="2">
+            <a:schemeClr val="accent1">
+              <a:shade val="15000"/>
+            </a:schemeClr>
+          </a:lnRef>
+          <a:fillRef idx="1">
+            <a:schemeClr val="accent1"/>
+          </a:fillRef>
+          <a:effectRef idx="0">
+            <a:schemeClr val="accent1"/>
+          </a:effectRef>
+          <a:fontRef idx="minor">
+            <a:schemeClr val="lt1"/>
+          </a:fontRef>
+        </p:style>
+        <p:txBody>
+          <a:bodyPr rtlCol="0" anchor="ctr"/>
+          <a:lstStyle/>
+          <a:p>
+            <a:pPr algn="ctr"/>
+            <a:r>
+              <a:rPr lang="en-US" sz="1200" dirty="0"/>
+              <a:t>settings</a:t>
+            </a:r>
+          </a:p>
+        </p:txBody>
+      </p:sp>
+      <p:sp>
+        <p:nvSpPr>
+          <p:cNvPr id="20" name="Scroll: Vertical 19">
+            <a:extLst>
+              <a:ext uri="{FF2B5EF4-FFF2-40B4-BE49-F238E27FC236}">
+                <a16:creationId xmlns:a16="http://schemas.microsoft.com/office/drawing/2014/main" id="{40514FF4-2AAE-54CC-BE35-E35F3DBB2F14}"/>
+              </a:ext>
+            </a:extLst>
+          </p:cNvPr>
+          <p:cNvSpPr/>
+          <p:nvPr/>
+        </p:nvSpPr>
+        <p:spPr>
+          <a:xfrm>
+            <a:off x="1263718" y="2789549"/>
+            <a:ext cx="947819" cy="640803"/>
+          </a:xfrm>
+          <a:prstGeom prst="verticalScroll">
+            <a:avLst/>
+          </a:prstGeom>
+        </p:spPr>
+        <p:style>
+          <a:lnRef idx="2">
+            <a:schemeClr val="accent2">
+              <a:shade val="15000"/>
+            </a:schemeClr>
+          </a:lnRef>
+          <a:fillRef idx="1">
+            <a:schemeClr val="accent2"/>
+          </a:fillRef>
+          <a:effectRef idx="0">
+            <a:schemeClr val="accent2"/>
+          </a:effectRef>
+          <a:fontRef idx="minor">
+            <a:schemeClr val="lt1"/>
+          </a:fontRef>
+        </p:style>
+        <p:txBody>
+          <a:bodyPr rtlCol="0" anchor="ctr"/>
+          <a:lstStyle/>
+          <a:p>
+            <a:pPr algn="ctr"/>
+            <a:r>
+              <a:rPr lang="en-US" sz="1100" dirty="0" err="1"/>
+              <a:t>generalSettings</a:t>
+            </a:r>
+            <a:endParaRPr lang="en-US" sz="1100" dirty="0"/>
+          </a:p>
+        </p:txBody>
+      </p:sp>
+      <p:sp>
+        <p:nvSpPr>
+          <p:cNvPr id="21" name="Rectangle: Top Corners One Rounded and One Snipped 20">
+            <a:extLst>
+              <a:ext uri="{FF2B5EF4-FFF2-40B4-BE49-F238E27FC236}">
+                <a16:creationId xmlns:a16="http://schemas.microsoft.com/office/drawing/2014/main" id="{7068FBF3-08CC-9896-5524-4CD29D9F0A18}"/>
+              </a:ext>
+            </a:extLst>
+          </p:cNvPr>
+          <p:cNvSpPr/>
+          <p:nvPr/>
+        </p:nvSpPr>
+        <p:spPr>
+          <a:xfrm flipH="1">
+            <a:off x="6126453" y="526057"/>
+            <a:ext cx="893129" cy="540199"/>
+          </a:xfrm>
+          <a:prstGeom prst="snipRoundRect">
+            <a:avLst>
+              <a:gd name="adj1" fmla="val 16667"/>
+              <a:gd name="adj2" fmla="val 50000"/>
+            </a:avLst>
+          </a:prstGeom>
+        </p:spPr>
+        <p:style>
+          <a:lnRef idx="2">
+            <a:schemeClr val="accent1">
+              <a:shade val="15000"/>
+            </a:schemeClr>
+          </a:lnRef>
+          <a:fillRef idx="1">
+            <a:schemeClr val="accent1"/>
+          </a:fillRef>
+          <a:effectRef idx="0">
+            <a:schemeClr val="accent1"/>
+          </a:effectRef>
+          <a:fontRef idx="minor">
+            <a:schemeClr val="lt1"/>
+          </a:fontRef>
+        </p:style>
+        <p:txBody>
+          <a:bodyPr rtlCol="0" anchor="ctr"/>
+          <a:lstStyle/>
+          <a:p>
+            <a:pPr algn="ctr"/>
+            <a:r>
+              <a:rPr lang="en-US" sz="1200" dirty="0"/>
+              <a:t>experiments</a:t>
+            </a:r>
+          </a:p>
+        </p:txBody>
+      </p:sp>
+      <p:sp>
+        <p:nvSpPr>
+          <p:cNvPr id="22" name="Scroll: Vertical 21">
+            <a:extLst>
+              <a:ext uri="{FF2B5EF4-FFF2-40B4-BE49-F238E27FC236}">
+                <a16:creationId xmlns:a16="http://schemas.microsoft.com/office/drawing/2014/main" id="{A5D880AD-83B5-DCC6-612B-69D7317D7761}"/>
+              </a:ext>
+            </a:extLst>
+          </p:cNvPr>
+          <p:cNvSpPr/>
+          <p:nvPr/>
+        </p:nvSpPr>
+        <p:spPr>
+          <a:xfrm>
+            <a:off x="6624480" y="1204777"/>
+            <a:ext cx="947819" cy="640803"/>
+          </a:xfrm>
+          <a:prstGeom prst="verticalScroll">
+            <a:avLst/>
+          </a:prstGeom>
+        </p:spPr>
+        <p:style>
+          <a:lnRef idx="2">
+            <a:schemeClr val="accent2">
+              <a:shade val="15000"/>
+            </a:schemeClr>
+          </a:lnRef>
+          <a:fillRef idx="1">
+            <a:schemeClr val="accent2"/>
+          </a:fillRef>
+          <a:effectRef idx="0">
+            <a:schemeClr val="accent2"/>
+          </a:effectRef>
+          <a:fontRef idx="minor">
+            <a:schemeClr val="lt1"/>
+          </a:fontRef>
+        </p:style>
+        <p:txBody>
+          <a:bodyPr rtlCol="0" anchor="ctr"/>
+          <a:lstStyle/>
+          <a:p>
+            <a:pPr algn="ctr"/>
+            <a:r>
+              <a:rPr lang="en-US" sz="1100" dirty="0" err="1"/>
+              <a:t>experimentXYZ</a:t>
+            </a:r>
+            <a:endParaRPr lang="en-US" sz="1100" dirty="0"/>
+          </a:p>
+        </p:txBody>
+      </p:sp>
+      <p:sp>
+        <p:nvSpPr>
+          <p:cNvPr id="23" name="Rectangle: Top Corners One Rounded and One Snipped 22">
+            <a:extLst>
+              <a:ext uri="{FF2B5EF4-FFF2-40B4-BE49-F238E27FC236}">
+                <a16:creationId xmlns:a16="http://schemas.microsoft.com/office/drawing/2014/main" id="{F77F36B6-A0F0-51D2-A8C3-60E1CC3D506B}"/>
+              </a:ext>
+            </a:extLst>
+          </p:cNvPr>
+          <p:cNvSpPr/>
+          <p:nvPr/>
+        </p:nvSpPr>
+        <p:spPr>
+          <a:xfrm flipH="1">
+            <a:off x="6624479" y="3536263"/>
+            <a:ext cx="893129" cy="540199"/>
+          </a:xfrm>
+          <a:prstGeom prst="snipRoundRect">
+            <a:avLst>
+              <a:gd name="adj1" fmla="val 16667"/>
+              <a:gd name="adj2" fmla="val 50000"/>
+            </a:avLst>
+          </a:prstGeom>
+        </p:spPr>
+        <p:style>
+          <a:lnRef idx="2">
+            <a:schemeClr val="accent1">
+              <a:shade val="15000"/>
+            </a:schemeClr>
+          </a:lnRef>
+          <a:fillRef idx="1">
+            <a:schemeClr val="accent1"/>
+          </a:fillRef>
+          <a:effectRef idx="0">
+            <a:schemeClr val="accent1"/>
+          </a:effectRef>
+          <a:fontRef idx="minor">
+            <a:schemeClr val="lt1"/>
+          </a:fontRef>
+        </p:style>
+        <p:txBody>
+          <a:bodyPr rtlCol="0" anchor="ctr"/>
+          <a:lstStyle/>
+          <a:p>
+            <a:pPr algn="ctr"/>
+            <a:r>
+              <a:rPr lang="en-US" sz="1200" dirty="0"/>
+              <a:t>users</a:t>
+            </a:r>
+          </a:p>
+        </p:txBody>
+      </p:sp>
+      <p:sp>
+        <p:nvSpPr>
+          <p:cNvPr id="24" name="Scroll: Vertical 23">
+            <a:extLst>
+              <a:ext uri="{FF2B5EF4-FFF2-40B4-BE49-F238E27FC236}">
+                <a16:creationId xmlns:a16="http://schemas.microsoft.com/office/drawing/2014/main" id="{A7767A25-6E63-BFEF-714D-B393F396F4C8}"/>
+              </a:ext>
+            </a:extLst>
+          </p:cNvPr>
+          <p:cNvSpPr/>
+          <p:nvPr/>
+        </p:nvSpPr>
+        <p:spPr>
+          <a:xfrm>
+            <a:off x="7071043" y="4282352"/>
+            <a:ext cx="947819" cy="640803"/>
+          </a:xfrm>
+          <a:prstGeom prst="verticalScroll">
+            <a:avLst/>
+          </a:prstGeom>
+        </p:spPr>
+        <p:style>
+          <a:lnRef idx="2">
+            <a:schemeClr val="accent2">
+              <a:shade val="15000"/>
+            </a:schemeClr>
+          </a:lnRef>
+          <a:fillRef idx="1">
+            <a:schemeClr val="accent2"/>
+          </a:fillRef>
+          <a:effectRef idx="0">
+            <a:schemeClr val="accent2"/>
+          </a:effectRef>
+          <a:fontRef idx="minor">
+            <a:schemeClr val="lt1"/>
+          </a:fontRef>
+        </p:style>
+        <p:txBody>
+          <a:bodyPr rtlCol="0" anchor="ctr"/>
+          <a:lstStyle/>
+          <a:p>
+            <a:pPr algn="ctr"/>
+            <a:r>
+              <a:rPr lang="en-US" sz="1100" dirty="0"/>
+              <a:t>userUID456</a:t>
+            </a:r>
+          </a:p>
+        </p:txBody>
+      </p:sp>
+      <p:sp>
+        <p:nvSpPr>
+          <p:cNvPr id="25" name="TextBox 24">
+            <a:extLst>
+              <a:ext uri="{FF2B5EF4-FFF2-40B4-BE49-F238E27FC236}">
+                <a16:creationId xmlns:a16="http://schemas.microsoft.com/office/drawing/2014/main" id="{2DC84034-9C2E-C758-D740-F3F1E2CFFCDD}"/>
+              </a:ext>
+            </a:extLst>
+          </p:cNvPr>
+          <p:cNvSpPr txBox="1"/>
+          <p:nvPr/>
+        </p:nvSpPr>
+        <p:spPr>
+          <a:xfrm>
+            <a:off x="8246686" y="3478594"/>
+            <a:ext cx="3540557" cy="307777"/>
+          </a:xfrm>
+          <a:prstGeom prst="rect">
+            <a:avLst/>
+          </a:prstGeom>
+          <a:noFill/>
+          <a:ln>
+            <a:solidFill>
+              <a:schemeClr val="accent1"/>
+            </a:solidFill>
+          </a:ln>
+        </p:spPr>
+        <p:txBody>
+          <a:bodyPr wrap="square" rtlCol="0">
+            <a:spAutoFit/>
+          </a:bodyPr>
+          <a:lstStyle/>
+          <a:p>
+            <a:r>
+              <a:rPr lang="en-US" sz="1400" i="1" dirty="0"/>
+              <a:t>Signed in users can create if </a:t>
+            </a:r>
+            <a:r>
+              <a:rPr lang="en-US" sz="1400" i="1" dirty="0" err="1"/>
+              <a:t>isOpen</a:t>
+            </a:r>
+            <a:r>
+              <a:rPr lang="en-US" sz="1400" i="1" dirty="0"/>
+              <a:t> </a:t>
+            </a:r>
+          </a:p>
+        </p:txBody>
+      </p:sp>
+      <p:sp>
+        <p:nvSpPr>
+          <p:cNvPr id="28" name="TextBox 27">
+            <a:extLst>
+              <a:ext uri="{FF2B5EF4-FFF2-40B4-BE49-F238E27FC236}">
+                <a16:creationId xmlns:a16="http://schemas.microsoft.com/office/drawing/2014/main" id="{23EED55D-0E41-C767-E72D-DAC7475D7451}"/>
+              </a:ext>
+            </a:extLst>
+          </p:cNvPr>
+          <p:cNvSpPr txBox="1"/>
+          <p:nvPr/>
+        </p:nvSpPr>
+        <p:spPr>
+          <a:xfrm>
+            <a:off x="8246686" y="3864781"/>
+            <a:ext cx="3540557" cy="523220"/>
+          </a:xfrm>
+          <a:prstGeom prst="rect">
+            <a:avLst/>
+          </a:prstGeom>
+          <a:noFill/>
+          <a:ln>
+            <a:solidFill>
+              <a:schemeClr val="accent1"/>
+            </a:solidFill>
+          </a:ln>
+        </p:spPr>
+        <p:txBody>
+          <a:bodyPr wrap="square" rtlCol="0">
+            <a:spAutoFit/>
+          </a:bodyPr>
+          <a:lstStyle/>
+          <a:p>
+            <a:r>
+              <a:rPr lang="en-US" sz="1400" i="1" dirty="0"/>
+              <a:t>Users can only update their own document if </a:t>
+            </a:r>
+            <a:r>
+              <a:rPr lang="en-US" sz="1400" i="1" dirty="0" err="1"/>
+              <a:t>isOpen</a:t>
+            </a:r>
+            <a:r>
+              <a:rPr lang="en-US" sz="1400" i="1" dirty="0"/>
+              <a:t> and number == null</a:t>
+            </a:r>
+          </a:p>
+        </p:txBody>
+      </p:sp>
+      <p:sp>
+        <p:nvSpPr>
+          <p:cNvPr id="29" name="Rectangle: Top Corners One Rounded and One Snipped 28">
+            <a:extLst>
+              <a:ext uri="{FF2B5EF4-FFF2-40B4-BE49-F238E27FC236}">
+                <a16:creationId xmlns:a16="http://schemas.microsoft.com/office/drawing/2014/main" id="{87137E0F-8DFD-4727-B8A7-E35A685FBC74}"/>
+              </a:ext>
+            </a:extLst>
+          </p:cNvPr>
+          <p:cNvSpPr/>
+          <p:nvPr/>
+        </p:nvSpPr>
+        <p:spPr>
+          <a:xfrm flipH="1">
+            <a:off x="6624480" y="2010850"/>
+            <a:ext cx="893129" cy="540199"/>
+          </a:xfrm>
+          <a:prstGeom prst="snipRoundRect">
+            <a:avLst>
+              <a:gd name="adj1" fmla="val 16667"/>
+              <a:gd name="adj2" fmla="val 50000"/>
+            </a:avLst>
+          </a:prstGeom>
+        </p:spPr>
+        <p:style>
+          <a:lnRef idx="2">
+            <a:schemeClr val="accent1">
+              <a:shade val="15000"/>
+            </a:schemeClr>
+          </a:lnRef>
+          <a:fillRef idx="1">
+            <a:schemeClr val="accent1"/>
+          </a:fillRef>
+          <a:effectRef idx="0">
+            <a:schemeClr val="accent1"/>
+          </a:effectRef>
+          <a:fontRef idx="minor">
+            <a:schemeClr val="lt1"/>
+          </a:fontRef>
+        </p:style>
+        <p:txBody>
+          <a:bodyPr rtlCol="0" anchor="ctr"/>
+          <a:lstStyle/>
+          <a:p>
+            <a:pPr algn="ctr"/>
+            <a:r>
+              <a:rPr lang="en-US" sz="1200" dirty="0"/>
+              <a:t>status</a:t>
+            </a:r>
+          </a:p>
+        </p:txBody>
+      </p:sp>
+      <p:sp>
+        <p:nvSpPr>
+          <p:cNvPr id="30" name="Scroll: Vertical 29">
+            <a:extLst>
+              <a:ext uri="{FF2B5EF4-FFF2-40B4-BE49-F238E27FC236}">
+                <a16:creationId xmlns:a16="http://schemas.microsoft.com/office/drawing/2014/main" id="{E7D6C39B-E83A-408E-F512-C8687AB582BA}"/>
+              </a:ext>
+            </a:extLst>
+          </p:cNvPr>
+          <p:cNvSpPr/>
+          <p:nvPr/>
+        </p:nvSpPr>
+        <p:spPr>
+          <a:xfrm>
+            <a:off x="7122507" y="2689570"/>
+            <a:ext cx="947819" cy="640803"/>
+          </a:xfrm>
+          <a:prstGeom prst="verticalScroll">
+            <a:avLst/>
+          </a:prstGeom>
+        </p:spPr>
+        <p:style>
+          <a:lnRef idx="2">
+            <a:schemeClr val="accent2">
+              <a:shade val="15000"/>
+            </a:schemeClr>
+          </a:lnRef>
+          <a:fillRef idx="1">
+            <a:schemeClr val="accent2"/>
+          </a:fillRef>
+          <a:effectRef idx="0">
+            <a:schemeClr val="accent2"/>
+          </a:effectRef>
+          <a:fontRef idx="minor">
+            <a:schemeClr val="lt1"/>
+          </a:fontRef>
+        </p:style>
+        <p:txBody>
+          <a:bodyPr rtlCol="0" anchor="ctr"/>
+          <a:lstStyle/>
+          <a:p>
+            <a:pPr algn="ctr"/>
+            <a:r>
+              <a:rPr lang="en-US" sz="1100" dirty="0"/>
+              <a:t>status</a:t>
+            </a:r>
+          </a:p>
+        </p:txBody>
+      </p:sp>
+      <p:sp>
+        <p:nvSpPr>
+          <p:cNvPr id="31" name="TextBox 30">
+            <a:extLst>
+              <a:ext uri="{FF2B5EF4-FFF2-40B4-BE49-F238E27FC236}">
+                <a16:creationId xmlns:a16="http://schemas.microsoft.com/office/drawing/2014/main" id="{5DB75B0C-4551-444C-9564-89DCE49EF472}"/>
+              </a:ext>
+            </a:extLst>
+          </p:cNvPr>
+          <p:cNvSpPr txBox="1"/>
+          <p:nvPr/>
+        </p:nvSpPr>
+        <p:spPr>
+          <a:xfrm>
+            <a:off x="8028384" y="2687165"/>
+            <a:ext cx="2533081" cy="738664"/>
+          </a:xfrm>
+          <a:prstGeom prst="rect">
+            <a:avLst/>
+          </a:prstGeom>
+          <a:noFill/>
+        </p:spPr>
+        <p:txBody>
+          <a:bodyPr wrap="square" rtlCol="0">
+            <a:spAutoFit/>
+          </a:bodyPr>
+          <a:lstStyle/>
+          <a:p>
+            <a:pPr marL="285750" indent="-285750">
+              <a:buFont typeface="Arial" panose="020B0604020202020204" pitchFamily="34" charset="0"/>
+              <a:buChar char="•"/>
+            </a:pPr>
+            <a:r>
+              <a:rPr lang="en-US" sz="1400" dirty="0"/>
+              <a:t>bool </a:t>
+            </a:r>
+            <a:r>
+              <a:rPr lang="en-US" sz="1400" dirty="0" err="1"/>
+              <a:t>isOpen</a:t>
+            </a:r>
+            <a:endParaRPr lang="en-US" sz="1400" dirty="0"/>
+          </a:p>
+          <a:p>
+            <a:pPr marL="285750" indent="-285750">
+              <a:buFont typeface="Arial" panose="020B0604020202020204" pitchFamily="34" charset="0"/>
+              <a:buChar char="•"/>
+            </a:pPr>
+            <a:r>
+              <a:rPr lang="en-US" sz="1400" dirty="0"/>
+              <a:t>int </a:t>
+            </a:r>
+            <a:r>
+              <a:rPr lang="en-US" sz="1400" dirty="0" err="1"/>
+              <a:t>winningNumber</a:t>
+            </a:r>
+            <a:endParaRPr lang="en-US" sz="1400" dirty="0"/>
+          </a:p>
+          <a:p>
+            <a:pPr marL="285750" indent="-285750">
+              <a:buFont typeface="Arial" panose="020B0604020202020204" pitchFamily="34" charset="0"/>
+              <a:buChar char="•"/>
+            </a:pPr>
+            <a:r>
+              <a:rPr lang="en-US" sz="1400" dirty="0"/>
+              <a:t>List&lt;String&gt; </a:t>
+            </a:r>
+            <a:r>
+              <a:rPr lang="en-US" sz="1400" dirty="0" err="1"/>
+              <a:t>winnerUIDs</a:t>
+            </a:r>
+            <a:endParaRPr lang="en-US" sz="1400" dirty="0"/>
+          </a:p>
+        </p:txBody>
+      </p:sp>
+      <p:sp>
+        <p:nvSpPr>
+          <p:cNvPr id="32" name="TextBox 31">
+            <a:extLst>
+              <a:ext uri="{FF2B5EF4-FFF2-40B4-BE49-F238E27FC236}">
+                <a16:creationId xmlns:a16="http://schemas.microsoft.com/office/drawing/2014/main" id="{CEC31643-F574-E81A-A667-F483E9919FD6}"/>
+              </a:ext>
+            </a:extLst>
+          </p:cNvPr>
+          <p:cNvSpPr txBox="1"/>
+          <p:nvPr/>
+        </p:nvSpPr>
+        <p:spPr>
+          <a:xfrm>
+            <a:off x="8296908" y="2068680"/>
+            <a:ext cx="3420598" cy="307777"/>
+          </a:xfrm>
+          <a:prstGeom prst="rect">
+            <a:avLst/>
+          </a:prstGeom>
+          <a:noFill/>
+          <a:ln>
+            <a:solidFill>
+              <a:schemeClr val="accent1"/>
+            </a:solidFill>
+          </a:ln>
+        </p:spPr>
+        <p:txBody>
+          <a:bodyPr wrap="square" rtlCol="0">
+            <a:spAutoFit/>
+          </a:bodyPr>
+          <a:lstStyle/>
+          <a:p>
+            <a:r>
+              <a:rPr lang="en-US" sz="1400" i="1" dirty="0"/>
+              <a:t>admin of experiment can update</a:t>
+            </a:r>
+          </a:p>
+        </p:txBody>
+      </p:sp>
+      <p:sp>
+        <p:nvSpPr>
+          <p:cNvPr id="33" name="TextBox 32">
+            <a:extLst>
+              <a:ext uri="{FF2B5EF4-FFF2-40B4-BE49-F238E27FC236}">
+                <a16:creationId xmlns:a16="http://schemas.microsoft.com/office/drawing/2014/main" id="{CC93EAA4-1AA3-6B96-F816-81FD21C3BA00}"/>
+              </a:ext>
+            </a:extLst>
+          </p:cNvPr>
+          <p:cNvSpPr txBox="1"/>
+          <p:nvPr/>
+        </p:nvSpPr>
+        <p:spPr>
+          <a:xfrm>
+            <a:off x="8296908" y="2381793"/>
+            <a:ext cx="1247925" cy="307777"/>
+          </a:xfrm>
+          <a:prstGeom prst="rect">
+            <a:avLst/>
+          </a:prstGeom>
+          <a:noFill/>
+          <a:ln>
+            <a:solidFill>
+              <a:schemeClr val="accent1"/>
+            </a:solidFill>
+          </a:ln>
+        </p:spPr>
+        <p:txBody>
+          <a:bodyPr wrap="square" rtlCol="0">
+            <a:spAutoFit/>
+          </a:bodyPr>
+          <a:lstStyle/>
+          <a:p>
+            <a:r>
+              <a:rPr lang="en-US" sz="1400" i="1" dirty="0"/>
+              <a:t>users can read</a:t>
+            </a:r>
+          </a:p>
+        </p:txBody>
+      </p:sp>
+      <p:sp>
+        <p:nvSpPr>
+          <p:cNvPr id="34" name="TextBox 33">
+            <a:extLst>
+              <a:ext uri="{FF2B5EF4-FFF2-40B4-BE49-F238E27FC236}">
+                <a16:creationId xmlns:a16="http://schemas.microsoft.com/office/drawing/2014/main" id="{9D48D28A-0677-8E65-8FF0-D830ACF9035C}"/>
+              </a:ext>
+            </a:extLst>
+          </p:cNvPr>
+          <p:cNvSpPr txBox="1"/>
+          <p:nvPr/>
+        </p:nvSpPr>
+        <p:spPr>
+          <a:xfrm>
+            <a:off x="7684063" y="5295418"/>
+            <a:ext cx="2380600" cy="954107"/>
+          </a:xfrm>
+          <a:prstGeom prst="rect">
+            <a:avLst/>
+          </a:prstGeom>
+          <a:noFill/>
+        </p:spPr>
+        <p:txBody>
+          <a:bodyPr wrap="square" rtlCol="0">
+            <a:spAutoFit/>
+          </a:bodyPr>
+          <a:lstStyle/>
+          <a:p>
+            <a:r>
+              <a:rPr lang="en-US" sz="1400" dirty="0"/>
+              <a:t>Class Vote {</a:t>
+            </a:r>
+          </a:p>
+          <a:p>
+            <a:r>
+              <a:rPr lang="en-US" sz="1400" dirty="0"/>
+              <a:t>    String </a:t>
+            </a:r>
+            <a:r>
+              <a:rPr lang="en-US" sz="1400" dirty="0" err="1"/>
+              <a:t>userUid</a:t>
+            </a:r>
+            <a:r>
+              <a:rPr lang="en-US" sz="1400" dirty="0"/>
+              <a:t>;</a:t>
+            </a:r>
+          </a:p>
+          <a:p>
+            <a:r>
+              <a:rPr lang="en-US" sz="1400" dirty="0"/>
+              <a:t>    Int </a:t>
+            </a:r>
+            <a:r>
+              <a:rPr lang="en-US" sz="1400" dirty="0" err="1"/>
+              <a:t>guessedNumber</a:t>
+            </a:r>
+            <a:r>
+              <a:rPr lang="en-US" sz="1400" dirty="0"/>
+              <a:t>;</a:t>
+            </a:r>
+          </a:p>
+          <a:p>
+            <a:r>
+              <a:rPr lang="en-US" sz="1400" dirty="0"/>
+              <a:t>}</a:t>
+            </a:r>
+          </a:p>
+        </p:txBody>
+      </p:sp>
+    </p:spTree>
+    <p:extLst>
+      <p:ext uri="{BB962C8B-B14F-4D97-AF65-F5344CB8AC3E}">
+        <p14:creationId xmlns:p14="http://schemas.microsoft.com/office/powerpoint/2010/main" val="2034909296"/>
+      </p:ext>
+    </p:extLst>
+  </p:cSld>
+  <p:clrMapOvr>
+    <a:masterClrMapping/>
+  </p:clrMapOvr>
+</p:sld>
+</file>
+
+<file path=ppt/slides/slide5.xml><?xml version="1.0" encoding="utf-8"?>
+<p:sld xmlns:a="http://schemas.openxmlformats.org/drawingml/2006/main" xmlns:r="http://schemas.openxmlformats.org/officeDocument/2006/relationships" xmlns:p="http://schemas.openxmlformats.org/presentationml/2006/main">
+  <p:cSld>
+    <p:spTree>
+      <p:nvGrpSpPr>
+        <p:cNvPr id="1" name=""/>
+        <p:cNvGrpSpPr/>
+        <p:nvPr/>
+      </p:nvGrpSpPr>
+      <p:grpSpPr>
+        <a:xfrm>
+          <a:off x="0" y="0"/>
+          <a:ext cx="0" cy="0"/>
+          <a:chOff x="0" y="0"/>
+          <a:chExt cx="0" cy="0"/>
+        </a:xfrm>
+      </p:grpSpPr>
+      <p:sp>
+        <p:nvSpPr>
+          <p:cNvPr id="4" name="Rectangle: Top Corners One Rounded and One Snipped 3">
+            <a:extLst>
+              <a:ext uri="{FF2B5EF4-FFF2-40B4-BE49-F238E27FC236}">
+                <a16:creationId xmlns:a16="http://schemas.microsoft.com/office/drawing/2014/main" id="{9E64377A-C4C3-0EB8-38A8-331848066C9B}"/>
+              </a:ext>
+            </a:extLst>
+          </p:cNvPr>
+          <p:cNvSpPr/>
+          <p:nvPr/>
+        </p:nvSpPr>
+        <p:spPr>
+          <a:xfrm flipH="1">
+            <a:off x="546847" y="93850"/>
+            <a:ext cx="1430754" cy="865375"/>
+          </a:xfrm>
+          <a:prstGeom prst="snipRoundRect">
+            <a:avLst>
+              <a:gd name="adj1" fmla="val 16667"/>
+              <a:gd name="adj2" fmla="val 50000"/>
+            </a:avLst>
+          </a:prstGeom>
+        </p:spPr>
+        <p:style>
+          <a:lnRef idx="2">
+            <a:schemeClr val="accent1">
+              <a:shade val="15000"/>
+            </a:schemeClr>
+          </a:lnRef>
+          <a:fillRef idx="1">
+            <a:schemeClr val="accent1"/>
+          </a:fillRef>
+          <a:effectRef idx="0">
+            <a:schemeClr val="accent1"/>
+          </a:effectRef>
+          <a:fontRef idx="minor">
+            <a:schemeClr val="lt1"/>
+          </a:fontRef>
+        </p:style>
+        <p:txBody>
+          <a:bodyPr rtlCol="0" anchor="ctr"/>
+          <a:lstStyle/>
+          <a:p>
+            <a:pPr algn="ctr"/>
+            <a:r>
+              <a:rPr lang="en-US" dirty="0"/>
+              <a:t>admins</a:t>
+            </a:r>
+          </a:p>
+        </p:txBody>
+      </p:sp>
+      <p:sp>
+        <p:nvSpPr>
+          <p:cNvPr id="6" name="Rectangle: Top Corners One Rounded and One Snipped 5">
+            <a:extLst>
+              <a:ext uri="{FF2B5EF4-FFF2-40B4-BE49-F238E27FC236}">
+                <a16:creationId xmlns:a16="http://schemas.microsoft.com/office/drawing/2014/main" id="{B8B95493-0DB9-43FD-C20E-6A0908ADD414}"/>
+              </a:ext>
+            </a:extLst>
+          </p:cNvPr>
+          <p:cNvSpPr/>
+          <p:nvPr/>
+        </p:nvSpPr>
+        <p:spPr>
+          <a:xfrm flipH="1">
+            <a:off x="1735556" y="2313150"/>
+            <a:ext cx="1430754" cy="865375"/>
+          </a:xfrm>
+          <a:prstGeom prst="snipRoundRect">
+            <a:avLst>
+              <a:gd name="adj1" fmla="val 16667"/>
+              <a:gd name="adj2" fmla="val 50000"/>
+            </a:avLst>
+          </a:prstGeom>
+        </p:spPr>
+        <p:style>
+          <a:lnRef idx="2">
+            <a:schemeClr val="accent1">
+              <a:shade val="15000"/>
+            </a:schemeClr>
+          </a:lnRef>
+          <a:fillRef idx="1">
+            <a:schemeClr val="accent1"/>
+          </a:fillRef>
+          <a:effectRef idx="0">
+            <a:schemeClr val="accent1"/>
+          </a:effectRef>
+          <a:fontRef idx="minor">
+            <a:schemeClr val="lt1"/>
+          </a:fontRef>
+        </p:style>
+        <p:txBody>
+          <a:bodyPr rtlCol="0" anchor="ctr"/>
+          <a:lstStyle/>
+          <a:p>
+            <a:pPr algn="ctr"/>
+            <a:r>
+              <a:rPr lang="en-US" dirty="0"/>
+              <a:t>ex-</a:t>
+            </a:r>
+            <a:r>
+              <a:rPr lang="en-US" dirty="0" err="1"/>
+              <a:t>periments</a:t>
+            </a:r>
+            <a:endParaRPr lang="en-US" dirty="0"/>
+          </a:p>
+        </p:txBody>
+      </p:sp>
+      <p:sp>
+        <p:nvSpPr>
+          <p:cNvPr id="7" name="Rectangle: Top Corners One Rounded and One Snipped 6">
+            <a:extLst>
+              <a:ext uri="{FF2B5EF4-FFF2-40B4-BE49-F238E27FC236}">
+                <a16:creationId xmlns:a16="http://schemas.microsoft.com/office/drawing/2014/main" id="{E3B6BC4F-1D00-C000-9BCD-345547D24757}"/>
+              </a:ext>
+            </a:extLst>
+          </p:cNvPr>
+          <p:cNvSpPr/>
+          <p:nvPr/>
+        </p:nvSpPr>
+        <p:spPr>
+          <a:xfrm flipH="1">
+            <a:off x="2943990" y="4563628"/>
+            <a:ext cx="1430754" cy="865375"/>
+          </a:xfrm>
+          <a:prstGeom prst="snipRoundRect">
+            <a:avLst>
+              <a:gd name="adj1" fmla="val 16667"/>
+              <a:gd name="adj2" fmla="val 50000"/>
+            </a:avLst>
+          </a:prstGeom>
+        </p:spPr>
+        <p:style>
+          <a:lnRef idx="2">
+            <a:schemeClr val="accent1">
+              <a:shade val="15000"/>
+            </a:schemeClr>
+          </a:lnRef>
+          <a:fillRef idx="1">
+            <a:schemeClr val="accent1"/>
+          </a:fillRef>
+          <a:effectRef idx="0">
+            <a:schemeClr val="accent1"/>
+          </a:effectRef>
+          <a:fontRef idx="minor">
+            <a:schemeClr val="lt1"/>
+          </a:fontRef>
+        </p:style>
+        <p:txBody>
+          <a:bodyPr rtlCol="0" anchor="ctr"/>
+          <a:lstStyle/>
+          <a:p>
+            <a:pPr algn="ctr"/>
+            <a:r>
+              <a:rPr lang="en-US" dirty="0"/>
+              <a:t>users</a:t>
+            </a:r>
+          </a:p>
+        </p:txBody>
+      </p:sp>
+      <p:sp>
+        <p:nvSpPr>
+          <p:cNvPr id="9" name="Scroll: Vertical 8">
+            <a:extLst>
+              <a:ext uri="{FF2B5EF4-FFF2-40B4-BE49-F238E27FC236}">
+                <a16:creationId xmlns:a16="http://schemas.microsoft.com/office/drawing/2014/main" id="{2CD99B52-E175-1507-1B2D-B52C0C091A36}"/>
+              </a:ext>
+            </a:extLst>
+          </p:cNvPr>
+          <p:cNvSpPr/>
+          <p:nvPr/>
+        </p:nvSpPr>
+        <p:spPr>
+          <a:xfrm>
+            <a:off x="1027341" y="1120589"/>
+            <a:ext cx="1900519" cy="1039626"/>
+          </a:xfrm>
+          <a:prstGeom prst="verticalScroll">
+            <a:avLst/>
+          </a:prstGeom>
+        </p:spPr>
+        <p:style>
+          <a:lnRef idx="2">
+            <a:schemeClr val="accent2">
+              <a:shade val="15000"/>
+            </a:schemeClr>
+          </a:lnRef>
+          <a:fillRef idx="1">
+            <a:schemeClr val="accent2"/>
+          </a:fillRef>
+          <a:effectRef idx="0">
+            <a:schemeClr val="accent2"/>
+          </a:effectRef>
+          <a:fontRef idx="minor">
+            <a:schemeClr val="lt1"/>
+          </a:fontRef>
+        </p:style>
+        <p:txBody>
+          <a:bodyPr rtlCol="0" anchor="ctr"/>
+          <a:lstStyle/>
+          <a:p>
+            <a:pPr algn="ctr"/>
+            <a:r>
+              <a:rPr lang="en-US" dirty="0"/>
+              <a:t>adminUID123</a:t>
+            </a:r>
+          </a:p>
+        </p:txBody>
+      </p:sp>
+      <p:sp>
+        <p:nvSpPr>
+          <p:cNvPr id="10" name="Scroll: Vertical 9">
+            <a:extLst>
+              <a:ext uri="{FF2B5EF4-FFF2-40B4-BE49-F238E27FC236}">
+                <a16:creationId xmlns:a16="http://schemas.microsoft.com/office/drawing/2014/main" id="{AD44C28E-1182-B22D-9B67-9FAE70E6A082}"/>
+              </a:ext>
+            </a:extLst>
+          </p:cNvPr>
+          <p:cNvSpPr/>
+          <p:nvPr/>
+        </p:nvSpPr>
+        <p:spPr>
+          <a:xfrm>
+            <a:off x="2174807" y="3353673"/>
+            <a:ext cx="1900519" cy="1039626"/>
+          </a:xfrm>
+          <a:prstGeom prst="verticalScroll">
+            <a:avLst/>
+          </a:prstGeom>
+        </p:spPr>
+        <p:style>
+          <a:lnRef idx="2">
+            <a:schemeClr val="accent2">
+              <a:shade val="15000"/>
+            </a:schemeClr>
+          </a:lnRef>
+          <a:fillRef idx="1">
+            <a:schemeClr val="accent2"/>
+          </a:fillRef>
+          <a:effectRef idx="0">
+            <a:schemeClr val="accent2"/>
+          </a:effectRef>
+          <a:fontRef idx="minor">
+            <a:schemeClr val="lt1"/>
+          </a:fontRef>
+        </p:style>
+        <p:txBody>
+          <a:bodyPr rtlCol="0" anchor="ctr"/>
+          <a:lstStyle/>
+          <a:p>
+            <a:pPr algn="ctr"/>
+            <a:r>
+              <a:rPr lang="en-US" dirty="0" err="1"/>
+              <a:t>experimentXYZ</a:t>
+            </a:r>
+            <a:endParaRPr lang="en-US" dirty="0"/>
+          </a:p>
+        </p:txBody>
+      </p:sp>
+      <p:sp>
+        <p:nvSpPr>
+          <p:cNvPr id="11" name="TextBox 10">
+            <a:extLst>
+              <a:ext uri="{FF2B5EF4-FFF2-40B4-BE49-F238E27FC236}">
+                <a16:creationId xmlns:a16="http://schemas.microsoft.com/office/drawing/2014/main" id="{5EE71C63-F3DC-C8AE-C4FF-7FBF9008900A}"/>
+              </a:ext>
+            </a:extLst>
+          </p:cNvPr>
+          <p:cNvSpPr txBox="1"/>
+          <p:nvPr/>
+        </p:nvSpPr>
+        <p:spPr>
+          <a:xfrm>
+            <a:off x="4349666" y="3249781"/>
+            <a:ext cx="1939978" cy="1569660"/>
+          </a:xfrm>
+          <a:prstGeom prst="rect">
+            <a:avLst/>
+          </a:prstGeom>
+          <a:noFill/>
+        </p:spPr>
+        <p:txBody>
+          <a:bodyPr wrap="square" rtlCol="0">
+            <a:spAutoFit/>
+          </a:bodyPr>
+          <a:lstStyle/>
+          <a:p>
+            <a:pPr marL="285750" indent="-285750">
+              <a:buFont typeface="Arial" panose="020B0604020202020204" pitchFamily="34" charset="0"/>
+              <a:buChar char="•"/>
+            </a:pPr>
+            <a:r>
+              <a:rPr lang="en-US" sz="1600" dirty="0"/>
+              <a:t>name</a:t>
+            </a:r>
+          </a:p>
+          <a:p>
+            <a:pPr marL="285750" indent="-285750">
+              <a:buFont typeface="Arial" panose="020B0604020202020204" pitchFamily="34" charset="0"/>
+              <a:buChar char="•"/>
+            </a:pPr>
+            <a:r>
+              <a:rPr lang="en-US" sz="1600" dirty="0"/>
+              <a:t>location</a:t>
+            </a:r>
+          </a:p>
+          <a:p>
+            <a:pPr marL="285750" indent="-285750">
+              <a:buFont typeface="Arial" panose="020B0604020202020204" pitchFamily="34" charset="0"/>
+              <a:buChar char="•"/>
+            </a:pPr>
+            <a:r>
+              <a:rPr lang="en-US" sz="1600" dirty="0"/>
+              <a:t>status</a:t>
+            </a:r>
+          </a:p>
+          <a:p>
+            <a:pPr marL="285750" indent="-285750">
+              <a:buFont typeface="Arial" panose="020B0604020202020204" pitchFamily="34" charset="0"/>
+              <a:buChar char="•"/>
+            </a:pPr>
+            <a:r>
+              <a:rPr lang="en-US" sz="1600" dirty="0" err="1"/>
+              <a:t>participantCount</a:t>
+            </a:r>
+            <a:endParaRPr lang="en-US" sz="1600" dirty="0"/>
+          </a:p>
+          <a:p>
+            <a:pPr marL="285750" indent="-285750">
+              <a:buFont typeface="Arial" panose="020B0604020202020204" pitchFamily="34" charset="0"/>
+              <a:buChar char="•"/>
+            </a:pPr>
+            <a:r>
+              <a:rPr lang="en-US" sz="1600" dirty="0" err="1"/>
+              <a:t>voteCount</a:t>
+            </a:r>
+            <a:endParaRPr lang="en-US" sz="1600" dirty="0"/>
+          </a:p>
+          <a:p>
+            <a:endParaRPr lang="en-US" sz="1600" dirty="0"/>
+          </a:p>
+        </p:txBody>
+      </p:sp>
+      <p:sp>
+        <p:nvSpPr>
+          <p:cNvPr id="12" name="TextBox 11">
+            <a:extLst>
+              <a:ext uri="{FF2B5EF4-FFF2-40B4-BE49-F238E27FC236}">
+                <a16:creationId xmlns:a16="http://schemas.microsoft.com/office/drawing/2014/main" id="{FB284E87-4CAE-C8D0-C9EF-C96ABF195110}"/>
+              </a:ext>
+            </a:extLst>
+          </p:cNvPr>
+          <p:cNvSpPr txBox="1"/>
+          <p:nvPr/>
+        </p:nvSpPr>
+        <p:spPr>
+          <a:xfrm>
+            <a:off x="2909950" y="1522621"/>
+            <a:ext cx="3379694" cy="338554"/>
+          </a:xfrm>
+          <a:prstGeom prst="rect">
+            <a:avLst/>
+          </a:prstGeom>
+          <a:noFill/>
+        </p:spPr>
+        <p:txBody>
+          <a:bodyPr wrap="square" rtlCol="0">
+            <a:spAutoFit/>
+          </a:bodyPr>
+          <a:lstStyle/>
+          <a:p>
+            <a:pPr marL="285750" indent="-285750">
+              <a:buFont typeface="Arial" panose="020B0604020202020204" pitchFamily="34" charset="0"/>
+              <a:buChar char="•"/>
+            </a:pPr>
+            <a:r>
+              <a:rPr lang="en-US" sz="1600" dirty="0" err="1"/>
+              <a:t>isAnonymous</a:t>
+            </a:r>
+            <a:endParaRPr lang="en-US" sz="1600" dirty="0"/>
+          </a:p>
+        </p:txBody>
+      </p:sp>
+      <p:sp>
+        <p:nvSpPr>
+          <p:cNvPr id="13" name="Scroll: Vertical 12">
+            <a:extLst>
+              <a:ext uri="{FF2B5EF4-FFF2-40B4-BE49-F238E27FC236}">
+                <a16:creationId xmlns:a16="http://schemas.microsoft.com/office/drawing/2014/main" id="{A828A30D-3A8D-2543-1D0D-0C93E0BB944E}"/>
+              </a:ext>
+            </a:extLst>
+          </p:cNvPr>
+          <p:cNvSpPr/>
+          <p:nvPr/>
+        </p:nvSpPr>
+        <p:spPr>
+          <a:xfrm>
+            <a:off x="3792056" y="5581090"/>
+            <a:ext cx="1900519" cy="1039626"/>
+          </a:xfrm>
+          <a:prstGeom prst="verticalScroll">
+            <a:avLst/>
+          </a:prstGeom>
+        </p:spPr>
+        <p:style>
+          <a:lnRef idx="2">
+            <a:schemeClr val="accent2">
+              <a:shade val="15000"/>
+            </a:schemeClr>
+          </a:lnRef>
+          <a:fillRef idx="1">
+            <a:schemeClr val="accent2"/>
+          </a:fillRef>
+          <a:effectRef idx="0">
+            <a:schemeClr val="accent2"/>
+          </a:effectRef>
+          <a:fontRef idx="minor">
+            <a:schemeClr val="lt1"/>
+          </a:fontRef>
+        </p:style>
+        <p:txBody>
+          <a:bodyPr rtlCol="0" anchor="ctr"/>
+          <a:lstStyle/>
+          <a:p>
+            <a:pPr algn="ctr"/>
+            <a:r>
+              <a:rPr lang="en-US" dirty="0"/>
+              <a:t>userUID467</a:t>
+            </a:r>
+          </a:p>
+        </p:txBody>
+      </p:sp>
+      <p:sp>
+        <p:nvSpPr>
+          <p:cNvPr id="26" name="TextBox 25">
+            <a:extLst>
+              <a:ext uri="{FF2B5EF4-FFF2-40B4-BE49-F238E27FC236}">
+                <a16:creationId xmlns:a16="http://schemas.microsoft.com/office/drawing/2014/main" id="{B850B1A6-2D83-4AF2-8EC7-B0DB03AC9380}"/>
+              </a:ext>
+            </a:extLst>
+          </p:cNvPr>
+          <p:cNvSpPr txBox="1"/>
+          <p:nvPr/>
+        </p:nvSpPr>
+        <p:spPr>
+          <a:xfrm>
+            <a:off x="5692575" y="5931626"/>
+            <a:ext cx="2519096" cy="338554"/>
+          </a:xfrm>
+          <a:prstGeom prst="rect">
+            <a:avLst/>
+          </a:prstGeom>
+          <a:noFill/>
+        </p:spPr>
+        <p:txBody>
+          <a:bodyPr wrap="square" rtlCol="0">
+            <a:spAutoFit/>
+          </a:bodyPr>
+          <a:lstStyle/>
+          <a:p>
+            <a:pPr marL="285750" indent="-285750">
+              <a:buFont typeface="Arial" panose="020B0604020202020204" pitchFamily="34" charset="0"/>
+              <a:buChar char="•"/>
+            </a:pPr>
+            <a:r>
+              <a:rPr lang="en-US" sz="1600" dirty="0"/>
+              <a:t>int number</a:t>
+            </a:r>
+          </a:p>
+        </p:txBody>
+      </p:sp>
+      <p:sp>
+        <p:nvSpPr>
+          <p:cNvPr id="3" name="TextBox 2">
+            <a:extLst>
+              <a:ext uri="{FF2B5EF4-FFF2-40B4-BE49-F238E27FC236}">
+                <a16:creationId xmlns:a16="http://schemas.microsoft.com/office/drawing/2014/main" id="{CB3027E8-03C6-9ED6-D0EB-B1607EAFB921}"/>
+              </a:ext>
+            </a:extLst>
+          </p:cNvPr>
+          <p:cNvSpPr txBox="1"/>
+          <p:nvPr/>
+        </p:nvSpPr>
+        <p:spPr>
+          <a:xfrm>
+            <a:off x="5389615" y="4819441"/>
+            <a:ext cx="2302125" cy="584775"/>
+          </a:xfrm>
+          <a:prstGeom prst="rect">
+            <a:avLst/>
+          </a:prstGeom>
+          <a:noFill/>
+        </p:spPr>
+        <p:txBody>
+          <a:bodyPr wrap="square" rtlCol="0">
+            <a:spAutoFit/>
+          </a:bodyPr>
+          <a:lstStyle/>
+          <a:p>
+            <a:r>
+              <a:rPr lang="en-US" sz="1600" dirty="0"/>
+              <a:t>If status == </a:t>
+            </a:r>
+            <a:r>
+              <a:rPr lang="en-US" sz="1600" dirty="0" err="1"/>
+              <a:t>inProgress</a:t>
+            </a:r>
+            <a:endParaRPr lang="en-US" sz="1600" dirty="0"/>
+          </a:p>
+          <a:p>
+            <a:endParaRPr lang="en-US" sz="1600" dirty="0"/>
+          </a:p>
+        </p:txBody>
+      </p:sp>
+    </p:spTree>
+    <p:extLst>
+      <p:ext uri="{BB962C8B-B14F-4D97-AF65-F5344CB8AC3E}">
+        <p14:creationId xmlns:p14="http://schemas.microsoft.com/office/powerpoint/2010/main" val="22949895"/>
       </p:ext>
     </p:extLst>
   </p:cSld>

</xml_diff>